<commit_message>
Se crean funciones de adm de cliente
Se crearon las funciones de mostrar agregar y editar clientes.
</commit_message>
<xml_diff>
--- a/Documentación/Documentation.pptx
+++ b/Documentación/Documentation.pptx
@@ -9,7 +9,10 @@
     <p:sldId id="260" r:id="rId3"/>
     <p:sldId id="256" r:id="rId4"/>
     <p:sldId id="258" r:id="rId5"/>
-    <p:sldId id="259" r:id="rId6"/>
+    <p:sldId id="262" r:id="rId6"/>
+    <p:sldId id="263" r:id="rId7"/>
+    <p:sldId id="259" r:id="rId8"/>
+    <p:sldId id="261" r:id="rId9"/>
   </p:sldIdLst>
   <p:sldSz cx="12192000" cy="6858000"/>
   <p:notesSz cx="6858000" cy="9144000"/>
@@ -247,7 +250,7 @@
           <a:p>
             <a:fld id="{5DB37A09-4840-4F25-837A-CE4EEBE13FCB}" type="datetimeFigureOut">
               <a:rPr lang="es-CO" smtClean="0"/>
-              <a:t>2/06/2020</a:t>
+              <a:t>9/06/2020</a:t>
             </a:fld>
             <a:endParaRPr lang="es-CO"/>
           </a:p>
@@ -417,7 +420,7 @@
           <a:p>
             <a:fld id="{5DB37A09-4840-4F25-837A-CE4EEBE13FCB}" type="datetimeFigureOut">
               <a:rPr lang="es-CO" smtClean="0"/>
-              <a:t>2/06/2020</a:t>
+              <a:t>9/06/2020</a:t>
             </a:fld>
             <a:endParaRPr lang="es-CO"/>
           </a:p>
@@ -597,7 +600,7 @@
           <a:p>
             <a:fld id="{5DB37A09-4840-4F25-837A-CE4EEBE13FCB}" type="datetimeFigureOut">
               <a:rPr lang="es-CO" smtClean="0"/>
-              <a:t>2/06/2020</a:t>
+              <a:t>9/06/2020</a:t>
             </a:fld>
             <a:endParaRPr lang="es-CO"/>
           </a:p>
@@ -767,7 +770,7 @@
           <a:p>
             <a:fld id="{5DB37A09-4840-4F25-837A-CE4EEBE13FCB}" type="datetimeFigureOut">
               <a:rPr lang="es-CO" smtClean="0"/>
-              <a:t>2/06/2020</a:t>
+              <a:t>9/06/2020</a:t>
             </a:fld>
             <a:endParaRPr lang="es-CO"/>
           </a:p>
@@ -1013,7 +1016,7 @@
           <a:p>
             <a:fld id="{5DB37A09-4840-4F25-837A-CE4EEBE13FCB}" type="datetimeFigureOut">
               <a:rPr lang="es-CO" smtClean="0"/>
-              <a:t>2/06/2020</a:t>
+              <a:t>9/06/2020</a:t>
             </a:fld>
             <a:endParaRPr lang="es-CO"/>
           </a:p>
@@ -1245,7 +1248,7 @@
           <a:p>
             <a:fld id="{5DB37A09-4840-4F25-837A-CE4EEBE13FCB}" type="datetimeFigureOut">
               <a:rPr lang="es-CO" smtClean="0"/>
-              <a:t>2/06/2020</a:t>
+              <a:t>9/06/2020</a:t>
             </a:fld>
             <a:endParaRPr lang="es-CO"/>
           </a:p>
@@ -1612,7 +1615,7 @@
           <a:p>
             <a:fld id="{5DB37A09-4840-4F25-837A-CE4EEBE13FCB}" type="datetimeFigureOut">
               <a:rPr lang="es-CO" smtClean="0"/>
-              <a:t>2/06/2020</a:t>
+              <a:t>9/06/2020</a:t>
             </a:fld>
             <a:endParaRPr lang="es-CO"/>
           </a:p>
@@ -1730,7 +1733,7 @@
           <a:p>
             <a:fld id="{5DB37A09-4840-4F25-837A-CE4EEBE13FCB}" type="datetimeFigureOut">
               <a:rPr lang="es-CO" smtClean="0"/>
-              <a:t>2/06/2020</a:t>
+              <a:t>9/06/2020</a:t>
             </a:fld>
             <a:endParaRPr lang="es-CO"/>
           </a:p>
@@ -1825,7 +1828,7 @@
           <a:p>
             <a:fld id="{5DB37A09-4840-4F25-837A-CE4EEBE13FCB}" type="datetimeFigureOut">
               <a:rPr lang="es-CO" smtClean="0"/>
-              <a:t>2/06/2020</a:t>
+              <a:t>9/06/2020</a:t>
             </a:fld>
             <a:endParaRPr lang="es-CO"/>
           </a:p>
@@ -2102,7 +2105,7 @@
           <a:p>
             <a:fld id="{5DB37A09-4840-4F25-837A-CE4EEBE13FCB}" type="datetimeFigureOut">
               <a:rPr lang="es-CO" smtClean="0"/>
-              <a:t>2/06/2020</a:t>
+              <a:t>9/06/2020</a:t>
             </a:fld>
             <a:endParaRPr lang="es-CO"/>
           </a:p>
@@ -2355,7 +2358,7 @@
           <a:p>
             <a:fld id="{5DB37A09-4840-4F25-837A-CE4EEBE13FCB}" type="datetimeFigureOut">
               <a:rPr lang="es-CO" smtClean="0"/>
-              <a:t>2/06/2020</a:t>
+              <a:t>9/06/2020</a:t>
             </a:fld>
             <a:endParaRPr lang="es-CO"/>
           </a:p>
@@ -2568,7 +2571,7 @@
           <a:p>
             <a:fld id="{5DB37A09-4840-4F25-837A-CE4EEBE13FCB}" type="datetimeFigureOut">
               <a:rPr lang="es-CO" smtClean="0"/>
-              <a:t>2/06/2020</a:t>
+              <a:t>9/06/2020</a:t>
             </a:fld>
             <a:endParaRPr lang="es-CO"/>
           </a:p>
@@ -3201,44 +3204,6 @@
           <a:chExt cx="0" cy="0"/>
         </a:xfrm>
       </p:grpSpPr>
-      <p:sp>
-        <p:nvSpPr>
-          <p:cNvPr id="2" name="Título 1"/>
-          <p:cNvSpPr>
-            <a:spLocks noGrp="1"/>
-          </p:cNvSpPr>
-          <p:nvPr>
-            <p:ph type="ctrTitle"/>
-          </p:nvPr>
-        </p:nvSpPr>
-        <p:spPr/>
-        <p:txBody>
-          <a:bodyPr/>
-          <a:lstStyle/>
-          <a:p>
-            <a:endParaRPr lang="es-CO"/>
-          </a:p>
-        </p:txBody>
-      </p:sp>
-      <p:sp>
-        <p:nvSpPr>
-          <p:cNvPr id="3" name="Subtítulo 2"/>
-          <p:cNvSpPr>
-            <a:spLocks noGrp="1"/>
-          </p:cNvSpPr>
-          <p:nvPr>
-            <p:ph type="subTitle" idx="1"/>
-          </p:nvPr>
-        </p:nvSpPr>
-        <p:spPr/>
-        <p:txBody>
-          <a:bodyPr/>
-          <a:lstStyle/>
-          <a:p>
-            <a:endParaRPr lang="es-CO"/>
-          </a:p>
-        </p:txBody>
-      </p:sp>
       <p:pic>
         <p:nvPicPr>
           <p:cNvPr id="4" name="Imagen 3"/>
@@ -3261,7 +3226,7 @@
         </p:blipFill>
         <p:spPr>
           <a:xfrm>
-            <a:off x="951704" y="-1640805"/>
+            <a:off x="1462067" y="-348573"/>
             <a:ext cx="9416955" cy="6647909"/>
           </a:xfrm>
           <a:prstGeom prst="rect">
@@ -3375,6 +3340,211 @@
 </file>
 
 <file path=ppt/slides/slide5.xml><?xml version="1.0" encoding="utf-8"?>
+<p:sld xmlns:a="http://schemas.openxmlformats.org/drawingml/2006/main" xmlns:r="http://schemas.openxmlformats.org/officeDocument/2006/relationships" xmlns:p="http://schemas.openxmlformats.org/presentationml/2006/main">
+  <p:cSld>
+    <p:spTree>
+      <p:nvGrpSpPr>
+        <p:cNvPr id="1" name=""/>
+        <p:cNvGrpSpPr/>
+        <p:nvPr/>
+      </p:nvGrpSpPr>
+      <p:grpSpPr>
+        <a:xfrm>
+          <a:off x="0" y="0"/>
+          <a:ext cx="0" cy="0"/>
+          <a:chOff x="0" y="0"/>
+          <a:chExt cx="0" cy="0"/>
+        </a:xfrm>
+      </p:grpSpPr>
+      <p:sp>
+        <p:nvSpPr>
+          <p:cNvPr id="2" name="Título 1"/>
+          <p:cNvSpPr>
+            <a:spLocks noGrp="1"/>
+          </p:cNvSpPr>
+          <p:nvPr>
+            <p:ph type="title"/>
+          </p:nvPr>
+        </p:nvSpPr>
+        <p:spPr/>
+        <p:txBody>
+          <a:bodyPr/>
+          <a:lstStyle/>
+          <a:p>
+            <a:r>
+              <a:rPr lang="es-ES" dirty="0" smtClean="0"/>
+              <a:t>Cliente</a:t>
+            </a:r>
+            <a:endParaRPr lang="es-CO" dirty="0"/>
+          </a:p>
+        </p:txBody>
+      </p:sp>
+      <p:sp>
+        <p:nvSpPr>
+          <p:cNvPr id="3" name="Marcador de contenido 2"/>
+          <p:cNvSpPr>
+            <a:spLocks noGrp="1"/>
+          </p:cNvSpPr>
+          <p:nvPr>
+            <p:ph idx="1"/>
+          </p:nvPr>
+        </p:nvSpPr>
+        <p:spPr/>
+        <p:txBody>
+          <a:bodyPr/>
+          <a:lstStyle/>
+          <a:p>
+            <a:r>
+              <a:rPr lang="es-ES" dirty="0" smtClean="0"/>
+              <a:t>Tarea</a:t>
+            </a:r>
+          </a:p>
+          <a:p>
+            <a:pPr lvl="1"/>
+            <a:r>
+              <a:rPr lang="es-ES" dirty="0" smtClean="0"/>
+              <a:t>El sistema debe buscar los clientes y mostrarlos unas vez inicia el programa.</a:t>
+            </a:r>
+          </a:p>
+          <a:p>
+            <a:pPr lvl="1"/>
+            <a:r>
+              <a:rPr lang="es-ES" dirty="0" smtClean="0"/>
+              <a:t>El sistema debe preguntar, si es un cliente nuevo, </a:t>
+            </a:r>
+            <a:r>
+              <a:rPr lang="es-ES" dirty="0" smtClean="0"/>
+              <a:t>o me </a:t>
+            </a:r>
+            <a:r>
+              <a:rPr lang="es-ES" dirty="0" smtClean="0"/>
+              <a:t>equivoqué digitando.  </a:t>
+            </a:r>
+          </a:p>
+          <a:p>
+            <a:pPr lvl="2"/>
+            <a:r>
+              <a:rPr lang="es-ES" dirty="0" smtClean="0">
+                <a:solidFill>
+                  <a:schemeClr val="accent6">
+                    <a:lumMod val="50000"/>
+                  </a:schemeClr>
+                </a:solidFill>
+              </a:rPr>
+              <a:t>Si el cliente es nuevo entonces lo agregar</a:t>
+            </a:r>
+          </a:p>
+          <a:p>
+            <a:pPr lvl="2"/>
+            <a:r>
+              <a:rPr lang="es-ES" dirty="0" smtClean="0"/>
+              <a:t>Si me equivoqué digitando el cliente, entonces, el sistema debe permitir corregir el cliente, por ahora se debe escribir todo el nombre del cliente.</a:t>
+            </a:r>
+          </a:p>
+          <a:p>
+            <a:pPr lvl="1"/>
+            <a:r>
+              <a:rPr lang="es-ES" dirty="0" smtClean="0"/>
+              <a:t>El sistema debe permitir cambiar el nombre de los clientes.</a:t>
+            </a:r>
+          </a:p>
+          <a:p>
+            <a:pPr lvl="1"/>
+            <a:r>
+              <a:rPr lang="es-ES" dirty="0" smtClean="0"/>
+              <a:t>El sistema debe permitir eliminar un cliente.</a:t>
+            </a:r>
+            <a:endParaRPr lang="es-CO" dirty="0"/>
+          </a:p>
+        </p:txBody>
+      </p:sp>
+    </p:spTree>
+    <p:extLst>
+      <p:ext uri="{BB962C8B-B14F-4D97-AF65-F5344CB8AC3E}">
+        <p14:creationId xmlns:p14="http://schemas.microsoft.com/office/powerpoint/2010/main" val="697877812"/>
+      </p:ext>
+    </p:extLst>
+  </p:cSld>
+  <p:clrMapOvr>
+    <a:masterClrMapping/>
+  </p:clrMapOvr>
+  <p:timing>
+    <p:tnLst>
+      <p:par>
+        <p:cTn id="1" dur="indefinite" restart="never" nodeType="tmRoot"/>
+      </p:par>
+    </p:tnLst>
+  </p:timing>
+</p:sld>
+</file>
+
+<file path=ppt/slides/slide6.xml><?xml version="1.0" encoding="utf-8"?>
+<p:sld xmlns:a="http://schemas.openxmlformats.org/drawingml/2006/main" xmlns:r="http://schemas.openxmlformats.org/officeDocument/2006/relationships" xmlns:p="http://schemas.openxmlformats.org/presentationml/2006/main">
+  <p:cSld>
+    <p:spTree>
+      <p:nvGrpSpPr>
+        <p:cNvPr id="1" name=""/>
+        <p:cNvGrpSpPr/>
+        <p:nvPr/>
+      </p:nvGrpSpPr>
+      <p:grpSpPr>
+        <a:xfrm>
+          <a:off x="0" y="0"/>
+          <a:ext cx="0" cy="0"/>
+          <a:chOff x="0" y="0"/>
+          <a:chExt cx="0" cy="0"/>
+        </a:xfrm>
+      </p:grpSpPr>
+      <p:pic>
+        <p:nvPicPr>
+          <p:cNvPr id="4" name="Marcador de contenido 3"/>
+          <p:cNvPicPr>
+            <a:picLocks noGrp="1" noChangeAspect="1"/>
+          </p:cNvPicPr>
+          <p:nvPr>
+            <p:ph idx="1"/>
+          </p:nvPr>
+        </p:nvPicPr>
+        <p:blipFill>
+          <a:blip r:embed="rId2" cstate="print">
+            <a:extLst>
+              <a:ext uri="{28A0092B-C50C-407E-A947-70E740481C1C}">
+                <a14:useLocalDpi xmlns:a14="http://schemas.microsoft.com/office/drawing/2010/main" val="0"/>
+              </a:ext>
+            </a:extLst>
+          </a:blip>
+          <a:stretch>
+            <a:fillRect/>
+          </a:stretch>
+        </p:blipFill>
+        <p:spPr>
+          <a:xfrm>
+            <a:off x="2524042" y="0"/>
+            <a:ext cx="5118704" cy="7129426"/>
+          </a:xfrm>
+        </p:spPr>
+      </p:pic>
+    </p:spTree>
+    <p:extLst>
+      <p:ext uri="{BB962C8B-B14F-4D97-AF65-F5344CB8AC3E}">
+        <p14:creationId xmlns:p14="http://schemas.microsoft.com/office/powerpoint/2010/main" val="1887276535"/>
+      </p:ext>
+    </p:extLst>
+  </p:cSld>
+  <p:clrMapOvr>
+    <a:masterClrMapping/>
+  </p:clrMapOvr>
+  <p:timing>
+    <p:tnLst>
+      <p:par>
+        <p:cTn id="1" dur="indefinite" restart="never" nodeType="tmRoot"/>
+      </p:par>
+    </p:tnLst>
+  </p:timing>
+</p:sld>
+</file>
+
+<file path=ppt/slides/slide7.xml><?xml version="1.0" encoding="utf-8"?>
 <p:sld xmlns:a="http://schemas.openxmlformats.org/drawingml/2006/main" xmlns:r="http://schemas.openxmlformats.org/officeDocument/2006/relationships" xmlns:p="http://schemas.openxmlformats.org/presentationml/2006/main">
   <p:cSld>
     <p:spTree>
@@ -3807,6 +3977,3758 @@
     <p:extLst>
       <p:ext uri="{BB962C8B-B14F-4D97-AF65-F5344CB8AC3E}">
         <p14:creationId xmlns:p14="http://schemas.microsoft.com/office/powerpoint/2010/main" val="1153346066"/>
+      </p:ext>
+    </p:extLst>
+  </p:cSld>
+  <p:clrMapOvr>
+    <a:masterClrMapping/>
+  </p:clrMapOvr>
+  <p:timing>
+    <p:tnLst>
+      <p:par>
+        <p:cTn id="1" dur="indefinite" restart="never" nodeType="tmRoot"/>
+      </p:par>
+    </p:tnLst>
+  </p:timing>
+</p:sld>
+</file>
+
+<file path=ppt/slides/slide8.xml><?xml version="1.0" encoding="utf-8"?>
+<p:sld xmlns:a="http://schemas.openxmlformats.org/drawingml/2006/main" xmlns:r="http://schemas.openxmlformats.org/officeDocument/2006/relationships" xmlns:p="http://schemas.openxmlformats.org/presentationml/2006/main">
+  <p:cSld>
+    <p:spTree>
+      <p:nvGrpSpPr>
+        <p:cNvPr id="1" name=""/>
+        <p:cNvGrpSpPr/>
+        <p:nvPr/>
+      </p:nvGrpSpPr>
+      <p:grpSpPr>
+        <a:xfrm>
+          <a:off x="0" y="0"/>
+          <a:ext cx="0" cy="0"/>
+          <a:chOff x="0" y="0"/>
+          <a:chExt cx="0" cy="0"/>
+        </a:xfrm>
+      </p:grpSpPr>
+      <p:sp>
+        <p:nvSpPr>
+          <p:cNvPr id="4" name="Elipse 3"/>
+          <p:cNvSpPr/>
+          <p:nvPr/>
+        </p:nvSpPr>
+        <p:spPr>
+          <a:xfrm>
+            <a:off x="7950217" y="15217"/>
+            <a:ext cx="191069" cy="204717"/>
+          </a:xfrm>
+          <a:prstGeom prst="ellipse">
+            <a:avLst/>
+          </a:prstGeom>
+        </p:spPr>
+        <p:style>
+          <a:lnRef idx="2">
+            <a:schemeClr val="accent1">
+              <a:shade val="50000"/>
+            </a:schemeClr>
+          </a:lnRef>
+          <a:fillRef idx="1">
+            <a:schemeClr val="accent1"/>
+          </a:fillRef>
+          <a:effectRef idx="0">
+            <a:schemeClr val="accent1"/>
+          </a:effectRef>
+          <a:fontRef idx="minor">
+            <a:schemeClr val="lt1"/>
+          </a:fontRef>
+        </p:style>
+        <p:txBody>
+          <a:bodyPr rtlCol="0" anchor="ctr"/>
+          <a:lstStyle/>
+          <a:p>
+            <a:pPr algn="ctr"/>
+            <a:endParaRPr lang="es-CO"/>
+          </a:p>
+        </p:txBody>
+      </p:sp>
+      <p:sp>
+        <p:nvSpPr>
+          <p:cNvPr id="5" name="CuadroTexto 4"/>
+          <p:cNvSpPr txBox="1"/>
+          <p:nvPr/>
+        </p:nvSpPr>
+        <p:spPr>
+          <a:xfrm>
+            <a:off x="104576" y="26613"/>
+            <a:ext cx="2439983" cy="369332"/>
+          </a:xfrm>
+          <a:prstGeom prst="rect">
+            <a:avLst/>
+          </a:prstGeom>
+          <a:noFill/>
+        </p:spPr>
+        <p:txBody>
+          <a:bodyPr wrap="square" rtlCol="0">
+            <a:spAutoFit/>
+          </a:bodyPr>
+          <a:lstStyle/>
+          <a:p>
+            <a:r>
+              <a:rPr lang="es-CO" dirty="0" err="1" smtClean="0"/>
+              <a:t>tigobo</a:t>
+            </a:r>
+            <a:r>
+              <a:rPr lang="es-CO" dirty="0" smtClean="0"/>
+              <a:t> </a:t>
+            </a:r>
+            <a:r>
+              <a:rPr lang="es-CO" dirty="0"/>
+              <a:t>2233 4456 5544</a:t>
+            </a:r>
+          </a:p>
+        </p:txBody>
+      </p:sp>
+      <p:sp>
+        <p:nvSpPr>
+          <p:cNvPr id="6" name="CuadroTexto 5"/>
+          <p:cNvSpPr txBox="1"/>
+          <p:nvPr/>
+        </p:nvSpPr>
+        <p:spPr>
+          <a:xfrm>
+            <a:off x="229624" y="440378"/>
+            <a:ext cx="261610" cy="369332"/>
+          </a:xfrm>
+          <a:prstGeom prst="rect">
+            <a:avLst/>
+          </a:prstGeom>
+          <a:noFill/>
+        </p:spPr>
+        <p:txBody>
+          <a:bodyPr wrap="none" rtlCol="0">
+            <a:spAutoFit/>
+          </a:bodyPr>
+          <a:lstStyle/>
+          <a:p>
+            <a:r>
+              <a:rPr lang="es-ES" dirty="0" smtClean="0"/>
+              <a:t>t</a:t>
+            </a:r>
+            <a:endParaRPr lang="es-CO" dirty="0"/>
+          </a:p>
+        </p:txBody>
+      </p:sp>
+      <p:sp>
+        <p:nvSpPr>
+          <p:cNvPr id="7" name="CuadroTexto 6"/>
+          <p:cNvSpPr txBox="1"/>
+          <p:nvPr/>
+        </p:nvSpPr>
+        <p:spPr>
+          <a:xfrm>
+            <a:off x="491234" y="440378"/>
+            <a:ext cx="237566" cy="369332"/>
+          </a:xfrm>
+          <a:prstGeom prst="rect">
+            <a:avLst/>
+          </a:prstGeom>
+          <a:noFill/>
+        </p:spPr>
+        <p:txBody>
+          <a:bodyPr wrap="none" rtlCol="0">
+            <a:spAutoFit/>
+          </a:bodyPr>
+          <a:lstStyle/>
+          <a:p>
+            <a:r>
+              <a:rPr lang="es-ES" dirty="0" smtClean="0"/>
+              <a:t>i</a:t>
+            </a:r>
+            <a:endParaRPr lang="es-CO" dirty="0"/>
+          </a:p>
+        </p:txBody>
+      </p:sp>
+      <p:sp>
+        <p:nvSpPr>
+          <p:cNvPr id="8" name="CuadroTexto 7"/>
+          <p:cNvSpPr txBox="1"/>
+          <p:nvPr/>
+        </p:nvSpPr>
+        <p:spPr>
+          <a:xfrm>
+            <a:off x="728800" y="440378"/>
+            <a:ext cx="293670" cy="369332"/>
+          </a:xfrm>
+          <a:prstGeom prst="rect">
+            <a:avLst/>
+          </a:prstGeom>
+          <a:noFill/>
+        </p:spPr>
+        <p:txBody>
+          <a:bodyPr wrap="none" rtlCol="0">
+            <a:spAutoFit/>
+          </a:bodyPr>
+          <a:lstStyle/>
+          <a:p>
+            <a:r>
+              <a:rPr lang="es-ES" dirty="0" smtClean="0"/>
+              <a:t>g</a:t>
+            </a:r>
+            <a:endParaRPr lang="es-CO" dirty="0"/>
+          </a:p>
+        </p:txBody>
+      </p:sp>
+      <p:sp>
+        <p:nvSpPr>
+          <p:cNvPr id="9" name="CuadroTexto 8"/>
+          <p:cNvSpPr txBox="1"/>
+          <p:nvPr/>
+        </p:nvSpPr>
+        <p:spPr>
+          <a:xfrm>
+            <a:off x="972484" y="440378"/>
+            <a:ext cx="306494" cy="369332"/>
+          </a:xfrm>
+          <a:prstGeom prst="rect">
+            <a:avLst/>
+          </a:prstGeom>
+          <a:noFill/>
+        </p:spPr>
+        <p:txBody>
+          <a:bodyPr wrap="none" rtlCol="0">
+            <a:spAutoFit/>
+          </a:bodyPr>
+          <a:lstStyle/>
+          <a:p>
+            <a:r>
+              <a:rPr lang="es-ES" dirty="0" smtClean="0"/>
+              <a:t>o</a:t>
+            </a:r>
+            <a:endParaRPr lang="es-CO" dirty="0"/>
+          </a:p>
+        </p:txBody>
+      </p:sp>
+      <p:sp>
+        <p:nvSpPr>
+          <p:cNvPr id="10" name="CuadroTexto 9"/>
+          <p:cNvSpPr txBox="1"/>
+          <p:nvPr/>
+        </p:nvSpPr>
+        <p:spPr>
+          <a:xfrm>
+            <a:off x="1244865" y="440378"/>
+            <a:ext cx="306494" cy="369332"/>
+          </a:xfrm>
+          <a:prstGeom prst="rect">
+            <a:avLst/>
+          </a:prstGeom>
+          <a:noFill/>
+        </p:spPr>
+        <p:txBody>
+          <a:bodyPr wrap="none" rtlCol="0">
+            <a:spAutoFit/>
+          </a:bodyPr>
+          <a:lstStyle/>
+          <a:p>
+            <a:r>
+              <a:rPr lang="es-ES" dirty="0" smtClean="0"/>
+              <a:t>b</a:t>
+            </a:r>
+            <a:endParaRPr lang="es-CO" dirty="0"/>
+          </a:p>
+        </p:txBody>
+      </p:sp>
+      <p:sp>
+        <p:nvSpPr>
+          <p:cNvPr id="11" name="CuadroTexto 10"/>
+          <p:cNvSpPr txBox="1"/>
+          <p:nvPr/>
+        </p:nvSpPr>
+        <p:spPr>
+          <a:xfrm>
+            <a:off x="1495582" y="440378"/>
+            <a:ext cx="306494" cy="369332"/>
+          </a:xfrm>
+          <a:prstGeom prst="rect">
+            <a:avLst/>
+          </a:prstGeom>
+          <a:noFill/>
+        </p:spPr>
+        <p:txBody>
+          <a:bodyPr wrap="none" rtlCol="0">
+            <a:spAutoFit/>
+          </a:bodyPr>
+          <a:lstStyle/>
+          <a:p>
+            <a:r>
+              <a:rPr lang="es-ES" dirty="0" smtClean="0"/>
+              <a:t>o</a:t>
+            </a:r>
+            <a:endParaRPr lang="es-CO" dirty="0"/>
+          </a:p>
+        </p:txBody>
+      </p:sp>
+      <p:sp>
+        <p:nvSpPr>
+          <p:cNvPr id="12" name="CuadroTexto 11"/>
+          <p:cNvSpPr txBox="1"/>
+          <p:nvPr/>
+        </p:nvSpPr>
+        <p:spPr>
+          <a:xfrm>
+            <a:off x="1721568" y="440378"/>
+            <a:ext cx="255198" cy="369332"/>
+          </a:xfrm>
+          <a:prstGeom prst="rect">
+            <a:avLst/>
+          </a:prstGeom>
+          <a:noFill/>
+        </p:spPr>
+        <p:txBody>
+          <a:bodyPr wrap="none" rtlCol="0">
+            <a:spAutoFit/>
+          </a:bodyPr>
+          <a:lstStyle/>
+          <a:p>
+            <a:r>
+              <a:rPr lang="es-ES" dirty="0" smtClean="0"/>
+              <a:t>-</a:t>
+            </a:r>
+            <a:endParaRPr lang="es-CO" dirty="0"/>
+          </a:p>
+        </p:txBody>
+      </p:sp>
+      <p:sp>
+        <p:nvSpPr>
+          <p:cNvPr id="13" name="Rectángulo 12"/>
+          <p:cNvSpPr/>
+          <p:nvPr/>
+        </p:nvSpPr>
+        <p:spPr>
+          <a:xfrm>
+            <a:off x="7215509" y="481948"/>
+            <a:ext cx="1680736" cy="931544"/>
+          </a:xfrm>
+          <a:prstGeom prst="rect">
+            <a:avLst/>
+          </a:prstGeom>
+        </p:spPr>
+        <p:style>
+          <a:lnRef idx="2">
+            <a:schemeClr val="accent1">
+              <a:shade val="50000"/>
+            </a:schemeClr>
+          </a:lnRef>
+          <a:fillRef idx="1">
+            <a:schemeClr val="accent1"/>
+          </a:fillRef>
+          <a:effectRef idx="0">
+            <a:schemeClr val="accent1"/>
+          </a:effectRef>
+          <a:fontRef idx="minor">
+            <a:schemeClr val="lt1"/>
+          </a:fontRef>
+        </p:style>
+        <p:txBody>
+          <a:bodyPr rtlCol="0" anchor="ctr"/>
+          <a:lstStyle/>
+          <a:p>
+            <a:pPr algn="ctr"/>
+            <a:r>
+              <a:rPr lang="es-ES" sz="800" dirty="0" smtClean="0"/>
+              <a:t>Tarea=“</a:t>
+            </a:r>
+            <a:r>
+              <a:rPr lang="es-CO" sz="800" dirty="0" err="1" smtClean="0"/>
+              <a:t>tigobo</a:t>
+            </a:r>
+            <a:r>
+              <a:rPr lang="es-CO" sz="800" dirty="0" smtClean="0"/>
+              <a:t> </a:t>
+            </a:r>
+            <a:r>
+              <a:rPr lang="es-CO" sz="800" dirty="0"/>
+              <a:t>2233 4456 </a:t>
+            </a:r>
+            <a:r>
+              <a:rPr lang="es-CO" sz="800" dirty="0" smtClean="0"/>
+              <a:t>5544</a:t>
+            </a:r>
+            <a:r>
+              <a:rPr lang="es-ES" sz="800" dirty="0" smtClean="0"/>
+              <a:t>”</a:t>
+            </a:r>
+          </a:p>
+          <a:p>
+            <a:pPr algn="ctr"/>
+            <a:r>
+              <a:rPr lang="es-ES" sz="800" dirty="0" err="1" smtClean="0"/>
+              <a:t>longuitdDeLaTarea</a:t>
+            </a:r>
+            <a:r>
+              <a:rPr lang="es-ES" sz="800" dirty="0" smtClean="0"/>
+              <a:t>=</a:t>
+            </a:r>
+            <a:r>
+              <a:rPr lang="es-ES" sz="800" dirty="0" err="1" smtClean="0"/>
+              <a:t>leng</a:t>
+            </a:r>
+            <a:r>
+              <a:rPr lang="es-ES" sz="800" dirty="0" smtClean="0"/>
+              <a:t>(tarea)</a:t>
+            </a:r>
+          </a:p>
+          <a:p>
+            <a:pPr algn="ctr"/>
+            <a:r>
+              <a:rPr lang="es-ES" sz="800" dirty="0" err="1" smtClean="0"/>
+              <a:t>logitudDeLaTarea</a:t>
+            </a:r>
+            <a:r>
+              <a:rPr lang="es-ES" sz="800" dirty="0" smtClean="0"/>
+              <a:t>=15</a:t>
+            </a:r>
+          </a:p>
+          <a:p>
+            <a:pPr algn="ctr"/>
+            <a:r>
+              <a:rPr lang="es-ES" sz="800" dirty="0" smtClean="0"/>
+              <a:t>navegador=0</a:t>
+            </a:r>
+          </a:p>
+          <a:p>
+            <a:pPr algn="ctr"/>
+            <a:r>
+              <a:rPr lang="es-ES" sz="800" dirty="0" smtClean="0"/>
+              <a:t>Tarea[0]</a:t>
+            </a:r>
+          </a:p>
+          <a:p>
+            <a:pPr algn="ctr"/>
+            <a:r>
+              <a:rPr lang="es-ES" sz="800" dirty="0" smtClean="0"/>
+              <a:t>Cliente,</a:t>
+            </a:r>
+          </a:p>
+          <a:p>
+            <a:pPr algn="ctr"/>
+            <a:r>
+              <a:rPr lang="es-ES" sz="800" dirty="0" err="1" smtClean="0"/>
+              <a:t>ContadorSondas</a:t>
+            </a:r>
+            <a:r>
+              <a:rPr lang="es-ES" sz="800" dirty="0" smtClean="0"/>
+              <a:t>=0</a:t>
+            </a:r>
+          </a:p>
+        </p:txBody>
+      </p:sp>
+      <p:cxnSp>
+        <p:nvCxnSpPr>
+          <p:cNvPr id="15" name="Conector recto de flecha 14"/>
+          <p:cNvCxnSpPr>
+            <a:stCxn id="4" idx="4"/>
+            <a:endCxn id="13" idx="0"/>
+          </p:cNvCxnSpPr>
+          <p:nvPr/>
+        </p:nvCxnSpPr>
+        <p:spPr>
+          <a:xfrm>
+            <a:off x="8045752" y="219934"/>
+            <a:ext cx="10125" cy="262014"/>
+          </a:xfrm>
+          <a:prstGeom prst="straightConnector1">
+            <a:avLst/>
+          </a:prstGeom>
+          <a:ln>
+            <a:tailEnd type="triangle"/>
+          </a:ln>
+        </p:spPr>
+        <p:style>
+          <a:lnRef idx="1">
+            <a:schemeClr val="accent1"/>
+          </a:lnRef>
+          <a:fillRef idx="0">
+            <a:schemeClr val="accent1"/>
+          </a:fillRef>
+          <a:effectRef idx="0">
+            <a:schemeClr val="accent1"/>
+          </a:effectRef>
+          <a:fontRef idx="minor">
+            <a:schemeClr val="tx1"/>
+          </a:fontRef>
+        </p:style>
+      </p:cxnSp>
+      <p:sp>
+        <p:nvSpPr>
+          <p:cNvPr id="16" name="Rombo 15"/>
+          <p:cNvSpPr/>
+          <p:nvPr/>
+        </p:nvSpPr>
+        <p:spPr>
+          <a:xfrm>
+            <a:off x="10082334" y="3181419"/>
+            <a:ext cx="313899" cy="341194"/>
+          </a:xfrm>
+          <a:prstGeom prst="diamond">
+            <a:avLst/>
+          </a:prstGeom>
+        </p:spPr>
+        <p:style>
+          <a:lnRef idx="2">
+            <a:schemeClr val="accent1">
+              <a:shade val="50000"/>
+            </a:schemeClr>
+          </a:lnRef>
+          <a:fillRef idx="1">
+            <a:schemeClr val="accent1"/>
+          </a:fillRef>
+          <a:effectRef idx="0">
+            <a:schemeClr val="accent1"/>
+          </a:effectRef>
+          <a:fontRef idx="minor">
+            <a:schemeClr val="lt1"/>
+          </a:fontRef>
+        </p:style>
+        <p:txBody>
+          <a:bodyPr rtlCol="0" anchor="ctr"/>
+          <a:lstStyle/>
+          <a:p>
+            <a:pPr algn="ctr"/>
+            <a:endParaRPr lang="es-CO"/>
+          </a:p>
+        </p:txBody>
+      </p:sp>
+      <p:sp>
+        <p:nvSpPr>
+          <p:cNvPr id="19" name="CuadroTexto 18"/>
+          <p:cNvSpPr txBox="1"/>
+          <p:nvPr/>
+        </p:nvSpPr>
+        <p:spPr>
+          <a:xfrm>
+            <a:off x="9565791" y="2821491"/>
+            <a:ext cx="1858201" cy="430887"/>
+          </a:xfrm>
+          <a:prstGeom prst="rect">
+            <a:avLst/>
+          </a:prstGeom>
+          <a:noFill/>
+        </p:spPr>
+        <p:txBody>
+          <a:bodyPr wrap="none" rtlCol="0">
+            <a:spAutoFit/>
+          </a:bodyPr>
+          <a:lstStyle/>
+          <a:p>
+            <a:r>
+              <a:rPr lang="es-ES" sz="1100" dirty="0" smtClean="0"/>
+              <a:t>¿Este carácter es un espacio?</a:t>
+            </a:r>
+          </a:p>
+          <a:p>
+            <a:r>
+              <a:rPr lang="es-ES" sz="1100" dirty="0" smtClean="0"/>
+              <a:t>Tarea[navegador]==“ “</a:t>
+            </a:r>
+            <a:endParaRPr lang="es-CO" sz="1100" dirty="0"/>
+          </a:p>
+        </p:txBody>
+      </p:sp>
+      <p:sp>
+        <p:nvSpPr>
+          <p:cNvPr id="22" name="CuadroTexto 21"/>
+          <p:cNvSpPr txBox="1"/>
+          <p:nvPr/>
+        </p:nvSpPr>
+        <p:spPr>
+          <a:xfrm>
+            <a:off x="8085899" y="1702657"/>
+            <a:ext cx="335348" cy="230832"/>
+          </a:xfrm>
+          <a:prstGeom prst="rect">
+            <a:avLst/>
+          </a:prstGeom>
+          <a:noFill/>
+        </p:spPr>
+        <p:txBody>
+          <a:bodyPr wrap="none" rtlCol="0">
+            <a:spAutoFit/>
+          </a:bodyPr>
+          <a:lstStyle/>
+          <a:p>
+            <a:r>
+              <a:rPr lang="es-ES" sz="900" dirty="0" smtClean="0"/>
+              <a:t>NO</a:t>
+            </a:r>
+            <a:endParaRPr lang="es-CO" sz="900" dirty="0"/>
+          </a:p>
+        </p:txBody>
+      </p:sp>
+      <p:sp>
+        <p:nvSpPr>
+          <p:cNvPr id="23" name="CuadroTexto 22"/>
+          <p:cNvSpPr txBox="1"/>
+          <p:nvPr/>
+        </p:nvSpPr>
+        <p:spPr>
+          <a:xfrm>
+            <a:off x="6314371" y="1748823"/>
+            <a:ext cx="284052" cy="261610"/>
+          </a:xfrm>
+          <a:prstGeom prst="rect">
+            <a:avLst/>
+          </a:prstGeom>
+          <a:noFill/>
+        </p:spPr>
+        <p:txBody>
+          <a:bodyPr wrap="none" rtlCol="0">
+            <a:spAutoFit/>
+          </a:bodyPr>
+          <a:lstStyle/>
+          <a:p>
+            <a:r>
+              <a:rPr lang="es-ES" sz="1100" dirty="0" smtClean="0"/>
+              <a:t>SI</a:t>
+            </a:r>
+            <a:endParaRPr lang="es-CO" sz="1100" dirty="0"/>
+          </a:p>
+        </p:txBody>
+      </p:sp>
+      <p:sp>
+        <p:nvSpPr>
+          <p:cNvPr id="28" name="Rectángulo 27"/>
+          <p:cNvSpPr/>
+          <p:nvPr/>
+        </p:nvSpPr>
+        <p:spPr>
+          <a:xfrm>
+            <a:off x="9904205" y="2157493"/>
+            <a:ext cx="1938975" cy="364845"/>
+          </a:xfrm>
+          <a:prstGeom prst="rect">
+            <a:avLst/>
+          </a:prstGeom>
+        </p:spPr>
+        <p:style>
+          <a:lnRef idx="2">
+            <a:schemeClr val="accent1">
+              <a:shade val="50000"/>
+            </a:schemeClr>
+          </a:lnRef>
+          <a:fillRef idx="1">
+            <a:schemeClr val="accent1"/>
+          </a:fillRef>
+          <a:effectRef idx="0">
+            <a:schemeClr val="accent1"/>
+          </a:effectRef>
+          <a:fontRef idx="minor">
+            <a:schemeClr val="lt1"/>
+          </a:fontRef>
+        </p:style>
+        <p:txBody>
+          <a:bodyPr rtlCol="0" anchor="ctr"/>
+          <a:lstStyle/>
+          <a:p>
+            <a:pPr algn="ctr"/>
+            <a:r>
+              <a:rPr lang="es-ES" sz="800" dirty="0" smtClean="0"/>
+              <a:t>Cliente= Cliente+ tarea[navegador]</a:t>
+            </a:r>
+          </a:p>
+          <a:p>
+            <a:pPr algn="ctr"/>
+            <a:endParaRPr lang="es-ES" sz="800" dirty="0" smtClean="0"/>
+          </a:p>
+        </p:txBody>
+      </p:sp>
+      <p:sp>
+        <p:nvSpPr>
+          <p:cNvPr id="47" name="CuadroTexto 46"/>
+          <p:cNvSpPr txBox="1"/>
+          <p:nvPr/>
+        </p:nvSpPr>
+        <p:spPr>
+          <a:xfrm>
+            <a:off x="1931760" y="440378"/>
+            <a:ext cx="301686" cy="369332"/>
+          </a:xfrm>
+          <a:prstGeom prst="rect">
+            <a:avLst/>
+          </a:prstGeom>
+          <a:noFill/>
+        </p:spPr>
+        <p:txBody>
+          <a:bodyPr wrap="none" rtlCol="0">
+            <a:spAutoFit/>
+          </a:bodyPr>
+          <a:lstStyle/>
+          <a:p>
+            <a:r>
+              <a:rPr lang="es-ES" dirty="0" smtClean="0"/>
+              <a:t>2</a:t>
+            </a:r>
+          </a:p>
+        </p:txBody>
+      </p:sp>
+      <p:sp>
+        <p:nvSpPr>
+          <p:cNvPr id="48" name="CuadroTexto 47"/>
+          <p:cNvSpPr txBox="1"/>
+          <p:nvPr/>
+        </p:nvSpPr>
+        <p:spPr>
+          <a:xfrm>
+            <a:off x="2202057" y="440378"/>
+            <a:ext cx="301686" cy="369332"/>
+          </a:xfrm>
+          <a:prstGeom prst="rect">
+            <a:avLst/>
+          </a:prstGeom>
+          <a:noFill/>
+        </p:spPr>
+        <p:txBody>
+          <a:bodyPr wrap="none" rtlCol="0">
+            <a:spAutoFit/>
+          </a:bodyPr>
+          <a:lstStyle/>
+          <a:p>
+            <a:r>
+              <a:rPr lang="es-ES" dirty="0"/>
+              <a:t>2</a:t>
+            </a:r>
+            <a:endParaRPr lang="es-CO" dirty="0"/>
+          </a:p>
+        </p:txBody>
+      </p:sp>
+      <p:sp>
+        <p:nvSpPr>
+          <p:cNvPr id="49" name="CuadroTexto 48"/>
+          <p:cNvSpPr txBox="1"/>
+          <p:nvPr/>
+        </p:nvSpPr>
+        <p:spPr>
+          <a:xfrm>
+            <a:off x="2409525" y="440378"/>
+            <a:ext cx="301686" cy="369332"/>
+          </a:xfrm>
+          <a:prstGeom prst="rect">
+            <a:avLst/>
+          </a:prstGeom>
+          <a:noFill/>
+        </p:spPr>
+        <p:txBody>
+          <a:bodyPr wrap="none" rtlCol="0">
+            <a:spAutoFit/>
+          </a:bodyPr>
+          <a:lstStyle/>
+          <a:p>
+            <a:r>
+              <a:rPr lang="es-ES" dirty="0" smtClean="0"/>
+              <a:t>3</a:t>
+            </a:r>
+            <a:endParaRPr lang="es-CO" dirty="0"/>
+          </a:p>
+        </p:txBody>
+      </p:sp>
+      <p:sp>
+        <p:nvSpPr>
+          <p:cNvPr id="50" name="CuadroTexto 49"/>
+          <p:cNvSpPr txBox="1"/>
+          <p:nvPr/>
+        </p:nvSpPr>
+        <p:spPr>
+          <a:xfrm>
+            <a:off x="2605798" y="440378"/>
+            <a:ext cx="301686" cy="369332"/>
+          </a:xfrm>
+          <a:prstGeom prst="rect">
+            <a:avLst/>
+          </a:prstGeom>
+          <a:noFill/>
+        </p:spPr>
+        <p:txBody>
+          <a:bodyPr wrap="none" rtlCol="0">
+            <a:spAutoFit/>
+          </a:bodyPr>
+          <a:lstStyle/>
+          <a:p>
+            <a:r>
+              <a:rPr lang="es-ES" dirty="0" smtClean="0"/>
+              <a:t>3</a:t>
+            </a:r>
+            <a:endParaRPr lang="es-CO" dirty="0"/>
+          </a:p>
+        </p:txBody>
+      </p:sp>
+      <p:sp>
+        <p:nvSpPr>
+          <p:cNvPr id="55" name="CuadroTexto 54"/>
+          <p:cNvSpPr txBox="1"/>
+          <p:nvPr/>
+        </p:nvSpPr>
+        <p:spPr>
+          <a:xfrm>
+            <a:off x="3144743" y="440378"/>
+            <a:ext cx="301686" cy="369332"/>
+          </a:xfrm>
+          <a:prstGeom prst="rect">
+            <a:avLst/>
+          </a:prstGeom>
+          <a:noFill/>
+        </p:spPr>
+        <p:txBody>
+          <a:bodyPr wrap="none" rtlCol="0">
+            <a:spAutoFit/>
+          </a:bodyPr>
+          <a:lstStyle/>
+          <a:p>
+            <a:r>
+              <a:rPr lang="es-ES" dirty="0" smtClean="0"/>
+              <a:t>4</a:t>
+            </a:r>
+          </a:p>
+        </p:txBody>
+      </p:sp>
+      <p:sp>
+        <p:nvSpPr>
+          <p:cNvPr id="56" name="CuadroTexto 55"/>
+          <p:cNvSpPr txBox="1"/>
+          <p:nvPr/>
+        </p:nvSpPr>
+        <p:spPr>
+          <a:xfrm>
+            <a:off x="2905784" y="440378"/>
+            <a:ext cx="255198" cy="369332"/>
+          </a:xfrm>
+          <a:prstGeom prst="rect">
+            <a:avLst/>
+          </a:prstGeom>
+          <a:noFill/>
+        </p:spPr>
+        <p:txBody>
+          <a:bodyPr wrap="none" rtlCol="0">
+            <a:spAutoFit/>
+          </a:bodyPr>
+          <a:lstStyle/>
+          <a:p>
+            <a:r>
+              <a:rPr lang="es-ES" dirty="0" smtClean="0"/>
+              <a:t>-</a:t>
+            </a:r>
+            <a:endParaRPr lang="es-CO" dirty="0"/>
+          </a:p>
+        </p:txBody>
+      </p:sp>
+      <p:sp>
+        <p:nvSpPr>
+          <p:cNvPr id="57" name="CuadroTexto 56"/>
+          <p:cNvSpPr txBox="1"/>
+          <p:nvPr/>
+        </p:nvSpPr>
+        <p:spPr>
+          <a:xfrm>
+            <a:off x="4057906" y="440378"/>
+            <a:ext cx="301686" cy="369332"/>
+          </a:xfrm>
+          <a:prstGeom prst="rect">
+            <a:avLst/>
+          </a:prstGeom>
+          <a:noFill/>
+        </p:spPr>
+        <p:txBody>
+          <a:bodyPr wrap="none" rtlCol="0">
+            <a:spAutoFit/>
+          </a:bodyPr>
+          <a:lstStyle/>
+          <a:p>
+            <a:r>
+              <a:rPr lang="es-ES" dirty="0"/>
+              <a:t>6</a:t>
+            </a:r>
+            <a:endParaRPr lang="es-ES" dirty="0" smtClean="0"/>
+          </a:p>
+        </p:txBody>
+      </p:sp>
+      <p:sp>
+        <p:nvSpPr>
+          <p:cNvPr id="58" name="CuadroTexto 57"/>
+          <p:cNvSpPr txBox="1"/>
+          <p:nvPr/>
+        </p:nvSpPr>
+        <p:spPr>
+          <a:xfrm>
+            <a:off x="3737310" y="440378"/>
+            <a:ext cx="301686" cy="369332"/>
+          </a:xfrm>
+          <a:prstGeom prst="rect">
+            <a:avLst/>
+          </a:prstGeom>
+          <a:noFill/>
+        </p:spPr>
+        <p:txBody>
+          <a:bodyPr wrap="none" rtlCol="0">
+            <a:spAutoFit/>
+          </a:bodyPr>
+          <a:lstStyle/>
+          <a:p>
+            <a:r>
+              <a:rPr lang="es-ES" dirty="0" smtClean="0"/>
+              <a:t>5</a:t>
+            </a:r>
+          </a:p>
+        </p:txBody>
+      </p:sp>
+      <p:sp>
+        <p:nvSpPr>
+          <p:cNvPr id="59" name="CuadroTexto 58"/>
+          <p:cNvSpPr txBox="1"/>
+          <p:nvPr/>
+        </p:nvSpPr>
+        <p:spPr>
+          <a:xfrm>
+            <a:off x="3483084" y="440378"/>
+            <a:ext cx="301686" cy="369332"/>
+          </a:xfrm>
+          <a:prstGeom prst="rect">
+            <a:avLst/>
+          </a:prstGeom>
+          <a:noFill/>
+        </p:spPr>
+        <p:txBody>
+          <a:bodyPr wrap="none" rtlCol="0">
+            <a:spAutoFit/>
+          </a:bodyPr>
+          <a:lstStyle/>
+          <a:p>
+            <a:r>
+              <a:rPr lang="es-ES" dirty="0" smtClean="0"/>
+              <a:t>4</a:t>
+            </a:r>
+          </a:p>
+        </p:txBody>
+      </p:sp>
+      <p:sp>
+        <p:nvSpPr>
+          <p:cNvPr id="61" name="CuadroTexto 60"/>
+          <p:cNvSpPr txBox="1"/>
+          <p:nvPr/>
+        </p:nvSpPr>
+        <p:spPr>
+          <a:xfrm>
+            <a:off x="192553" y="684937"/>
+            <a:ext cx="301686" cy="369332"/>
+          </a:xfrm>
+          <a:prstGeom prst="rect">
+            <a:avLst/>
+          </a:prstGeom>
+          <a:noFill/>
+        </p:spPr>
+        <p:txBody>
+          <a:bodyPr wrap="none" rtlCol="0">
+            <a:spAutoFit/>
+          </a:bodyPr>
+          <a:lstStyle/>
+          <a:p>
+            <a:r>
+              <a:rPr lang="es-ES" dirty="0" smtClean="0">
+                <a:solidFill>
+                  <a:schemeClr val="accent1">
+                    <a:lumMod val="75000"/>
+                  </a:schemeClr>
+                </a:solidFill>
+              </a:rPr>
+              <a:t>0</a:t>
+            </a:r>
+            <a:endParaRPr lang="es-CO" dirty="0">
+              <a:solidFill>
+                <a:schemeClr val="accent1">
+                  <a:lumMod val="75000"/>
+                </a:schemeClr>
+              </a:solidFill>
+            </a:endParaRPr>
+          </a:p>
+        </p:txBody>
+      </p:sp>
+      <p:sp>
+        <p:nvSpPr>
+          <p:cNvPr id="62" name="CuadroTexto 61"/>
+          <p:cNvSpPr txBox="1"/>
+          <p:nvPr/>
+        </p:nvSpPr>
+        <p:spPr>
+          <a:xfrm>
+            <a:off x="434635" y="684937"/>
+            <a:ext cx="301686" cy="369332"/>
+          </a:xfrm>
+          <a:prstGeom prst="rect">
+            <a:avLst/>
+          </a:prstGeom>
+          <a:noFill/>
+        </p:spPr>
+        <p:txBody>
+          <a:bodyPr wrap="none" rtlCol="0">
+            <a:spAutoFit/>
+          </a:bodyPr>
+          <a:lstStyle/>
+          <a:p>
+            <a:r>
+              <a:rPr lang="es-ES" dirty="0">
+                <a:solidFill>
+                  <a:schemeClr val="accent1">
+                    <a:lumMod val="75000"/>
+                  </a:schemeClr>
+                </a:solidFill>
+              </a:rPr>
+              <a:t>1</a:t>
+            </a:r>
+            <a:endParaRPr lang="es-CO" dirty="0">
+              <a:solidFill>
+                <a:schemeClr val="accent1">
+                  <a:lumMod val="75000"/>
+                </a:schemeClr>
+              </a:solidFill>
+            </a:endParaRPr>
+          </a:p>
+        </p:txBody>
+      </p:sp>
+      <p:sp>
+        <p:nvSpPr>
+          <p:cNvPr id="63" name="CuadroTexto 62"/>
+          <p:cNvSpPr txBox="1"/>
+          <p:nvPr/>
+        </p:nvSpPr>
+        <p:spPr>
+          <a:xfrm>
+            <a:off x="693665" y="684937"/>
+            <a:ext cx="301686" cy="369332"/>
+          </a:xfrm>
+          <a:prstGeom prst="rect">
+            <a:avLst/>
+          </a:prstGeom>
+          <a:noFill/>
+        </p:spPr>
+        <p:txBody>
+          <a:bodyPr wrap="none" rtlCol="0">
+            <a:spAutoFit/>
+          </a:bodyPr>
+          <a:lstStyle/>
+          <a:p>
+            <a:r>
+              <a:rPr lang="es-ES" dirty="0" smtClean="0">
+                <a:solidFill>
+                  <a:schemeClr val="accent1">
+                    <a:lumMod val="75000"/>
+                  </a:schemeClr>
+                </a:solidFill>
+              </a:rPr>
+              <a:t>2</a:t>
+            </a:r>
+            <a:endParaRPr lang="es-CO" dirty="0">
+              <a:solidFill>
+                <a:schemeClr val="accent1">
+                  <a:lumMod val="75000"/>
+                </a:schemeClr>
+              </a:solidFill>
+            </a:endParaRPr>
+          </a:p>
+        </p:txBody>
+      </p:sp>
+      <p:sp>
+        <p:nvSpPr>
+          <p:cNvPr id="64" name="CuadroTexto 63"/>
+          <p:cNvSpPr txBox="1"/>
+          <p:nvPr/>
+        </p:nvSpPr>
+        <p:spPr>
+          <a:xfrm>
+            <a:off x="945745" y="684937"/>
+            <a:ext cx="301686" cy="369332"/>
+          </a:xfrm>
+          <a:prstGeom prst="rect">
+            <a:avLst/>
+          </a:prstGeom>
+          <a:noFill/>
+        </p:spPr>
+        <p:txBody>
+          <a:bodyPr wrap="none" rtlCol="0">
+            <a:spAutoFit/>
+          </a:bodyPr>
+          <a:lstStyle/>
+          <a:p>
+            <a:r>
+              <a:rPr lang="es-ES" dirty="0" smtClean="0">
+                <a:solidFill>
+                  <a:schemeClr val="accent1">
+                    <a:lumMod val="75000"/>
+                  </a:schemeClr>
+                </a:solidFill>
+              </a:rPr>
+              <a:t>3</a:t>
+            </a:r>
+            <a:endParaRPr lang="es-CO" dirty="0">
+              <a:solidFill>
+                <a:schemeClr val="accent1">
+                  <a:lumMod val="75000"/>
+                </a:schemeClr>
+              </a:solidFill>
+            </a:endParaRPr>
+          </a:p>
+        </p:txBody>
+      </p:sp>
+      <p:sp>
+        <p:nvSpPr>
+          <p:cNvPr id="65" name="CuadroTexto 64"/>
+          <p:cNvSpPr txBox="1"/>
+          <p:nvPr/>
+        </p:nvSpPr>
+        <p:spPr>
+          <a:xfrm>
+            <a:off x="1211311" y="684937"/>
+            <a:ext cx="301686" cy="369332"/>
+          </a:xfrm>
+          <a:prstGeom prst="rect">
+            <a:avLst/>
+          </a:prstGeom>
+          <a:noFill/>
+        </p:spPr>
+        <p:txBody>
+          <a:bodyPr wrap="none" rtlCol="0">
+            <a:spAutoFit/>
+          </a:bodyPr>
+          <a:lstStyle/>
+          <a:p>
+            <a:r>
+              <a:rPr lang="es-ES" dirty="0" smtClean="0">
+                <a:solidFill>
+                  <a:schemeClr val="accent1">
+                    <a:lumMod val="75000"/>
+                  </a:schemeClr>
+                </a:solidFill>
+              </a:rPr>
+              <a:t>4</a:t>
+            </a:r>
+            <a:endParaRPr lang="es-CO" dirty="0">
+              <a:solidFill>
+                <a:schemeClr val="accent1">
+                  <a:lumMod val="75000"/>
+                </a:schemeClr>
+              </a:solidFill>
+            </a:endParaRPr>
+          </a:p>
+        </p:txBody>
+      </p:sp>
+      <p:sp>
+        <p:nvSpPr>
+          <p:cNvPr id="66" name="CuadroTexto 65"/>
+          <p:cNvSpPr txBox="1"/>
+          <p:nvPr/>
+        </p:nvSpPr>
+        <p:spPr>
+          <a:xfrm>
+            <a:off x="1473366" y="684937"/>
+            <a:ext cx="301686" cy="369332"/>
+          </a:xfrm>
+          <a:prstGeom prst="rect">
+            <a:avLst/>
+          </a:prstGeom>
+          <a:noFill/>
+        </p:spPr>
+        <p:txBody>
+          <a:bodyPr wrap="none" rtlCol="0">
+            <a:spAutoFit/>
+          </a:bodyPr>
+          <a:lstStyle/>
+          <a:p>
+            <a:r>
+              <a:rPr lang="es-ES" dirty="0" smtClean="0">
+                <a:solidFill>
+                  <a:schemeClr val="accent1">
+                    <a:lumMod val="75000"/>
+                  </a:schemeClr>
+                </a:solidFill>
+              </a:rPr>
+              <a:t>5</a:t>
+            </a:r>
+            <a:endParaRPr lang="es-CO" dirty="0">
+              <a:solidFill>
+                <a:schemeClr val="accent1">
+                  <a:lumMod val="75000"/>
+                </a:schemeClr>
+              </a:solidFill>
+            </a:endParaRPr>
+          </a:p>
+        </p:txBody>
+      </p:sp>
+      <p:sp>
+        <p:nvSpPr>
+          <p:cNvPr id="67" name="CuadroTexto 66"/>
+          <p:cNvSpPr txBox="1"/>
+          <p:nvPr/>
+        </p:nvSpPr>
+        <p:spPr>
+          <a:xfrm>
+            <a:off x="1951513" y="684937"/>
+            <a:ext cx="301686" cy="369332"/>
+          </a:xfrm>
+          <a:prstGeom prst="rect">
+            <a:avLst/>
+          </a:prstGeom>
+          <a:noFill/>
+        </p:spPr>
+        <p:txBody>
+          <a:bodyPr wrap="none" rtlCol="0">
+            <a:spAutoFit/>
+          </a:bodyPr>
+          <a:lstStyle/>
+          <a:p>
+            <a:r>
+              <a:rPr lang="es-ES" dirty="0" smtClean="0">
+                <a:solidFill>
+                  <a:schemeClr val="accent1">
+                    <a:lumMod val="75000"/>
+                  </a:schemeClr>
+                </a:solidFill>
+              </a:rPr>
+              <a:t>7</a:t>
+            </a:r>
+            <a:endParaRPr lang="es-CO" dirty="0">
+              <a:solidFill>
+                <a:schemeClr val="accent1">
+                  <a:lumMod val="75000"/>
+                </a:schemeClr>
+              </a:solidFill>
+            </a:endParaRPr>
+          </a:p>
+        </p:txBody>
+      </p:sp>
+      <p:sp>
+        <p:nvSpPr>
+          <p:cNvPr id="68" name="CuadroTexto 67"/>
+          <p:cNvSpPr txBox="1"/>
+          <p:nvPr/>
+        </p:nvSpPr>
+        <p:spPr>
+          <a:xfrm>
+            <a:off x="1714951" y="684937"/>
+            <a:ext cx="301686" cy="369332"/>
+          </a:xfrm>
+          <a:prstGeom prst="rect">
+            <a:avLst/>
+          </a:prstGeom>
+          <a:noFill/>
+        </p:spPr>
+        <p:txBody>
+          <a:bodyPr wrap="none" rtlCol="0">
+            <a:spAutoFit/>
+          </a:bodyPr>
+          <a:lstStyle/>
+          <a:p>
+            <a:r>
+              <a:rPr lang="es-ES" dirty="0" smtClean="0">
+                <a:solidFill>
+                  <a:schemeClr val="accent1">
+                    <a:lumMod val="75000"/>
+                  </a:schemeClr>
+                </a:solidFill>
+              </a:rPr>
+              <a:t>6</a:t>
+            </a:r>
+            <a:endParaRPr lang="es-CO" dirty="0">
+              <a:solidFill>
+                <a:schemeClr val="accent1">
+                  <a:lumMod val="75000"/>
+                </a:schemeClr>
+              </a:solidFill>
+            </a:endParaRPr>
+          </a:p>
+        </p:txBody>
+      </p:sp>
+      <p:sp>
+        <p:nvSpPr>
+          <p:cNvPr id="69" name="CuadroTexto 68"/>
+          <p:cNvSpPr txBox="1"/>
+          <p:nvPr/>
+        </p:nvSpPr>
+        <p:spPr>
+          <a:xfrm>
+            <a:off x="2224105" y="684937"/>
+            <a:ext cx="301686" cy="369332"/>
+          </a:xfrm>
+          <a:prstGeom prst="rect">
+            <a:avLst/>
+          </a:prstGeom>
+          <a:noFill/>
+        </p:spPr>
+        <p:txBody>
+          <a:bodyPr wrap="none" rtlCol="0">
+            <a:spAutoFit/>
+          </a:bodyPr>
+          <a:lstStyle/>
+          <a:p>
+            <a:r>
+              <a:rPr lang="es-ES" dirty="0" smtClean="0">
+                <a:solidFill>
+                  <a:schemeClr val="accent1">
+                    <a:lumMod val="75000"/>
+                  </a:schemeClr>
+                </a:solidFill>
+              </a:rPr>
+              <a:t>8</a:t>
+            </a:r>
+            <a:endParaRPr lang="es-CO" dirty="0">
+              <a:solidFill>
+                <a:schemeClr val="accent1">
+                  <a:lumMod val="75000"/>
+                </a:schemeClr>
+              </a:solidFill>
+            </a:endParaRPr>
+          </a:p>
+        </p:txBody>
+      </p:sp>
+      <p:sp>
+        <p:nvSpPr>
+          <p:cNvPr id="70" name="CuadroTexto 69"/>
+          <p:cNvSpPr txBox="1"/>
+          <p:nvPr/>
+        </p:nvSpPr>
+        <p:spPr>
+          <a:xfrm>
+            <a:off x="2422582" y="684937"/>
+            <a:ext cx="301686" cy="369332"/>
+          </a:xfrm>
+          <a:prstGeom prst="rect">
+            <a:avLst/>
+          </a:prstGeom>
+          <a:noFill/>
+        </p:spPr>
+        <p:txBody>
+          <a:bodyPr wrap="none" rtlCol="0">
+            <a:spAutoFit/>
+          </a:bodyPr>
+          <a:lstStyle/>
+          <a:p>
+            <a:r>
+              <a:rPr lang="es-ES" dirty="0" smtClean="0">
+                <a:solidFill>
+                  <a:schemeClr val="accent1">
+                    <a:lumMod val="75000"/>
+                  </a:schemeClr>
+                </a:solidFill>
+              </a:rPr>
+              <a:t>9</a:t>
+            </a:r>
+            <a:endParaRPr lang="es-CO" dirty="0">
+              <a:solidFill>
+                <a:schemeClr val="accent1">
+                  <a:lumMod val="75000"/>
+                </a:schemeClr>
+              </a:solidFill>
+            </a:endParaRPr>
+          </a:p>
+        </p:txBody>
+      </p:sp>
+      <p:sp>
+        <p:nvSpPr>
+          <p:cNvPr id="71" name="CuadroTexto 70"/>
+          <p:cNvSpPr txBox="1"/>
+          <p:nvPr/>
+        </p:nvSpPr>
+        <p:spPr>
+          <a:xfrm>
+            <a:off x="2584023" y="684937"/>
+            <a:ext cx="418704" cy="369332"/>
+          </a:xfrm>
+          <a:prstGeom prst="rect">
+            <a:avLst/>
+          </a:prstGeom>
+          <a:noFill/>
+        </p:spPr>
+        <p:txBody>
+          <a:bodyPr wrap="none" rtlCol="0">
+            <a:spAutoFit/>
+          </a:bodyPr>
+          <a:lstStyle/>
+          <a:p>
+            <a:r>
+              <a:rPr lang="es-ES" dirty="0" smtClean="0">
+                <a:solidFill>
+                  <a:schemeClr val="accent1">
+                    <a:lumMod val="75000"/>
+                  </a:schemeClr>
+                </a:solidFill>
+              </a:rPr>
+              <a:t>10</a:t>
+            </a:r>
+            <a:endParaRPr lang="es-CO" dirty="0">
+              <a:solidFill>
+                <a:schemeClr val="accent1">
+                  <a:lumMod val="75000"/>
+                </a:schemeClr>
+              </a:solidFill>
+            </a:endParaRPr>
+          </a:p>
+        </p:txBody>
+      </p:sp>
+      <p:sp>
+        <p:nvSpPr>
+          <p:cNvPr id="72" name="CuadroTexto 71"/>
+          <p:cNvSpPr txBox="1"/>
+          <p:nvPr/>
+        </p:nvSpPr>
+        <p:spPr>
+          <a:xfrm>
+            <a:off x="3156009" y="684937"/>
+            <a:ext cx="418704" cy="369332"/>
+          </a:xfrm>
+          <a:prstGeom prst="rect">
+            <a:avLst/>
+          </a:prstGeom>
+          <a:noFill/>
+        </p:spPr>
+        <p:txBody>
+          <a:bodyPr wrap="none" rtlCol="0">
+            <a:spAutoFit/>
+          </a:bodyPr>
+          <a:lstStyle/>
+          <a:p>
+            <a:r>
+              <a:rPr lang="es-ES" dirty="0" smtClean="0">
+                <a:solidFill>
+                  <a:schemeClr val="accent1">
+                    <a:lumMod val="75000"/>
+                  </a:schemeClr>
+                </a:solidFill>
+              </a:rPr>
+              <a:t>12</a:t>
+            </a:r>
+          </a:p>
+        </p:txBody>
+      </p:sp>
+      <p:sp>
+        <p:nvSpPr>
+          <p:cNvPr id="73" name="CuadroTexto 72"/>
+          <p:cNvSpPr txBox="1"/>
+          <p:nvPr/>
+        </p:nvSpPr>
+        <p:spPr>
+          <a:xfrm>
+            <a:off x="2873503" y="684937"/>
+            <a:ext cx="418704" cy="369332"/>
+          </a:xfrm>
+          <a:prstGeom prst="rect">
+            <a:avLst/>
+          </a:prstGeom>
+          <a:noFill/>
+        </p:spPr>
+        <p:txBody>
+          <a:bodyPr wrap="none" rtlCol="0">
+            <a:spAutoFit/>
+          </a:bodyPr>
+          <a:lstStyle/>
+          <a:p>
+            <a:r>
+              <a:rPr lang="es-ES" dirty="0" smtClean="0">
+                <a:solidFill>
+                  <a:schemeClr val="accent1">
+                    <a:lumMod val="75000"/>
+                  </a:schemeClr>
+                </a:solidFill>
+              </a:rPr>
+              <a:t>11</a:t>
+            </a:r>
+            <a:endParaRPr lang="es-CO" dirty="0">
+              <a:solidFill>
+                <a:schemeClr val="accent1">
+                  <a:lumMod val="75000"/>
+                </a:schemeClr>
+              </a:solidFill>
+            </a:endParaRPr>
+          </a:p>
+        </p:txBody>
+      </p:sp>
+      <p:sp>
+        <p:nvSpPr>
+          <p:cNvPr id="74" name="CuadroTexto 73"/>
+          <p:cNvSpPr txBox="1"/>
+          <p:nvPr/>
+        </p:nvSpPr>
+        <p:spPr>
+          <a:xfrm>
+            <a:off x="4045792" y="684937"/>
+            <a:ext cx="418704" cy="369332"/>
+          </a:xfrm>
+          <a:prstGeom prst="rect">
+            <a:avLst/>
+          </a:prstGeom>
+          <a:noFill/>
+        </p:spPr>
+        <p:txBody>
+          <a:bodyPr wrap="none" rtlCol="0">
+            <a:spAutoFit/>
+          </a:bodyPr>
+          <a:lstStyle/>
+          <a:p>
+            <a:r>
+              <a:rPr lang="es-ES" dirty="0" smtClean="0">
+                <a:solidFill>
+                  <a:schemeClr val="accent1">
+                    <a:lumMod val="75000"/>
+                  </a:schemeClr>
+                </a:solidFill>
+              </a:rPr>
+              <a:t>15</a:t>
+            </a:r>
+            <a:endParaRPr lang="es-CO" dirty="0">
+              <a:solidFill>
+                <a:schemeClr val="accent1">
+                  <a:lumMod val="75000"/>
+                </a:schemeClr>
+              </a:solidFill>
+            </a:endParaRPr>
+          </a:p>
+        </p:txBody>
+      </p:sp>
+      <p:sp>
+        <p:nvSpPr>
+          <p:cNvPr id="75" name="CuadroTexto 74"/>
+          <p:cNvSpPr txBox="1"/>
+          <p:nvPr/>
+        </p:nvSpPr>
+        <p:spPr>
+          <a:xfrm>
+            <a:off x="3452956" y="684937"/>
+            <a:ext cx="418704" cy="369332"/>
+          </a:xfrm>
+          <a:prstGeom prst="rect">
+            <a:avLst/>
+          </a:prstGeom>
+          <a:noFill/>
+        </p:spPr>
+        <p:txBody>
+          <a:bodyPr wrap="none" rtlCol="0">
+            <a:spAutoFit/>
+          </a:bodyPr>
+          <a:lstStyle/>
+          <a:p>
+            <a:r>
+              <a:rPr lang="es-ES" dirty="0" smtClean="0">
+                <a:solidFill>
+                  <a:schemeClr val="accent1">
+                    <a:lumMod val="75000"/>
+                  </a:schemeClr>
+                </a:solidFill>
+              </a:rPr>
+              <a:t>13</a:t>
+            </a:r>
+            <a:endParaRPr lang="es-CO" dirty="0">
+              <a:solidFill>
+                <a:schemeClr val="accent1">
+                  <a:lumMod val="75000"/>
+                </a:schemeClr>
+              </a:solidFill>
+            </a:endParaRPr>
+          </a:p>
+        </p:txBody>
+      </p:sp>
+      <p:sp>
+        <p:nvSpPr>
+          <p:cNvPr id="76" name="CuadroTexto 75"/>
+          <p:cNvSpPr txBox="1"/>
+          <p:nvPr/>
+        </p:nvSpPr>
+        <p:spPr>
+          <a:xfrm>
+            <a:off x="3702424" y="684937"/>
+            <a:ext cx="418704" cy="369332"/>
+          </a:xfrm>
+          <a:prstGeom prst="rect">
+            <a:avLst/>
+          </a:prstGeom>
+          <a:noFill/>
+        </p:spPr>
+        <p:txBody>
+          <a:bodyPr wrap="none" rtlCol="0">
+            <a:spAutoFit/>
+          </a:bodyPr>
+          <a:lstStyle/>
+          <a:p>
+            <a:r>
+              <a:rPr lang="es-ES" dirty="0" smtClean="0">
+                <a:solidFill>
+                  <a:schemeClr val="accent1">
+                    <a:lumMod val="75000"/>
+                  </a:schemeClr>
+                </a:solidFill>
+              </a:rPr>
+              <a:t>14</a:t>
+            </a:r>
+            <a:endParaRPr lang="es-CO" dirty="0">
+              <a:solidFill>
+                <a:schemeClr val="accent1">
+                  <a:lumMod val="75000"/>
+                </a:schemeClr>
+              </a:solidFill>
+            </a:endParaRPr>
+          </a:p>
+        </p:txBody>
+      </p:sp>
+      <p:sp>
+        <p:nvSpPr>
+          <p:cNvPr id="81" name="Rombo 80"/>
+          <p:cNvSpPr/>
+          <p:nvPr/>
+        </p:nvSpPr>
+        <p:spPr>
+          <a:xfrm>
+            <a:off x="8838401" y="2208813"/>
+            <a:ext cx="295275" cy="261760"/>
+          </a:xfrm>
+          <a:prstGeom prst="diamond">
+            <a:avLst/>
+          </a:prstGeom>
+        </p:spPr>
+        <p:style>
+          <a:lnRef idx="2">
+            <a:schemeClr val="accent1">
+              <a:shade val="50000"/>
+            </a:schemeClr>
+          </a:lnRef>
+          <a:fillRef idx="1">
+            <a:schemeClr val="accent1"/>
+          </a:fillRef>
+          <a:effectRef idx="0">
+            <a:schemeClr val="accent1"/>
+          </a:effectRef>
+          <a:fontRef idx="minor">
+            <a:schemeClr val="lt1"/>
+          </a:fontRef>
+        </p:style>
+        <p:txBody>
+          <a:bodyPr rtlCol="0" anchor="ctr"/>
+          <a:lstStyle/>
+          <a:p>
+            <a:pPr algn="ctr"/>
+            <a:endParaRPr lang="es-CO"/>
+          </a:p>
+        </p:txBody>
+      </p:sp>
+      <p:sp>
+        <p:nvSpPr>
+          <p:cNvPr id="85" name="CuadroTexto 84"/>
+          <p:cNvSpPr txBox="1"/>
+          <p:nvPr/>
+        </p:nvSpPr>
+        <p:spPr>
+          <a:xfrm>
+            <a:off x="8894979" y="1705053"/>
+            <a:ext cx="1341624" cy="338554"/>
+          </a:xfrm>
+          <a:prstGeom prst="rect">
+            <a:avLst/>
+          </a:prstGeom>
+          <a:noFill/>
+        </p:spPr>
+        <p:txBody>
+          <a:bodyPr wrap="square" rtlCol="0">
+            <a:spAutoFit/>
+          </a:bodyPr>
+          <a:lstStyle/>
+          <a:p>
+            <a:r>
+              <a:rPr lang="es-ES" sz="800" dirty="0" smtClean="0"/>
+              <a:t>¿Es una letra?</a:t>
+            </a:r>
+          </a:p>
+          <a:p>
+            <a:r>
+              <a:rPr lang="es-ES" sz="800" dirty="0" smtClean="0"/>
+              <a:t>Tarea[navegador]</a:t>
+            </a:r>
+            <a:r>
+              <a:rPr lang="es-CO" sz="800" dirty="0" smtClean="0"/>
+              <a:t>==“ ”</a:t>
+            </a:r>
+            <a:endParaRPr lang="es-ES" sz="800" dirty="0"/>
+          </a:p>
+        </p:txBody>
+      </p:sp>
+      <p:sp>
+        <p:nvSpPr>
+          <p:cNvPr id="123" name="Rectángulo 122"/>
+          <p:cNvSpPr/>
+          <p:nvPr/>
+        </p:nvSpPr>
+        <p:spPr>
+          <a:xfrm>
+            <a:off x="8047621" y="5650310"/>
+            <a:ext cx="1876834" cy="842194"/>
+          </a:xfrm>
+          <a:prstGeom prst="rect">
+            <a:avLst/>
+          </a:prstGeom>
+        </p:spPr>
+        <p:style>
+          <a:lnRef idx="2">
+            <a:schemeClr val="accent1">
+              <a:shade val="50000"/>
+            </a:schemeClr>
+          </a:lnRef>
+          <a:fillRef idx="1">
+            <a:schemeClr val="accent1"/>
+          </a:fillRef>
+          <a:effectRef idx="0">
+            <a:schemeClr val="accent1"/>
+          </a:effectRef>
+          <a:fontRef idx="minor">
+            <a:schemeClr val="lt1"/>
+          </a:fontRef>
+        </p:style>
+        <p:txBody>
+          <a:bodyPr rtlCol="0" anchor="ctr"/>
+          <a:lstStyle/>
+          <a:p>
+            <a:pPr algn="ctr"/>
+            <a:r>
+              <a:rPr lang="es-ES" sz="1100" dirty="0"/>
+              <a:t>Aumenta al navegador</a:t>
+            </a:r>
+          </a:p>
+          <a:p>
+            <a:pPr algn="ctr"/>
+            <a:r>
+              <a:rPr lang="es-ES" sz="1100" dirty="0"/>
+              <a:t>Navegador=navegador+1</a:t>
+            </a:r>
+          </a:p>
+          <a:p>
+            <a:pPr algn="ctr"/>
+            <a:r>
+              <a:rPr lang="es-ES" sz="1100" dirty="0"/>
+              <a:t>Navegador +=</a:t>
+            </a:r>
+          </a:p>
+        </p:txBody>
+      </p:sp>
+      <p:sp>
+        <p:nvSpPr>
+          <p:cNvPr id="132" name="CuadroTexto 131"/>
+          <p:cNvSpPr txBox="1"/>
+          <p:nvPr/>
+        </p:nvSpPr>
+        <p:spPr>
+          <a:xfrm>
+            <a:off x="9320252" y="2051185"/>
+            <a:ext cx="284052" cy="261610"/>
+          </a:xfrm>
+          <a:prstGeom prst="rect">
+            <a:avLst/>
+          </a:prstGeom>
+          <a:noFill/>
+        </p:spPr>
+        <p:txBody>
+          <a:bodyPr wrap="none" rtlCol="0">
+            <a:spAutoFit/>
+          </a:bodyPr>
+          <a:lstStyle/>
+          <a:p>
+            <a:r>
+              <a:rPr lang="es-ES" sz="1100" dirty="0" smtClean="0"/>
+              <a:t>SI</a:t>
+            </a:r>
+            <a:endParaRPr lang="es-CO" sz="1100" dirty="0"/>
+          </a:p>
+        </p:txBody>
+      </p:sp>
+      <p:cxnSp>
+        <p:nvCxnSpPr>
+          <p:cNvPr id="134" name="Conector angular 133"/>
+          <p:cNvCxnSpPr>
+            <a:stCxn id="81" idx="3"/>
+            <a:endCxn id="28" idx="1"/>
+          </p:cNvCxnSpPr>
+          <p:nvPr/>
+        </p:nvCxnSpPr>
+        <p:spPr>
+          <a:xfrm>
+            <a:off x="9133676" y="2339693"/>
+            <a:ext cx="770529" cy="223"/>
+          </a:xfrm>
+          <a:prstGeom prst="bentConnector3">
+            <a:avLst/>
+          </a:prstGeom>
+          <a:ln>
+            <a:tailEnd type="triangle"/>
+          </a:ln>
+        </p:spPr>
+        <p:style>
+          <a:lnRef idx="1">
+            <a:schemeClr val="accent1"/>
+          </a:lnRef>
+          <a:fillRef idx="0">
+            <a:schemeClr val="accent1"/>
+          </a:fillRef>
+          <a:effectRef idx="0">
+            <a:schemeClr val="accent1"/>
+          </a:effectRef>
+          <a:fontRef idx="minor">
+            <a:schemeClr val="tx1"/>
+          </a:fontRef>
+        </p:style>
+      </p:cxnSp>
+      <p:cxnSp>
+        <p:nvCxnSpPr>
+          <p:cNvPr id="140" name="Conector angular 139"/>
+          <p:cNvCxnSpPr>
+            <a:stCxn id="28" idx="2"/>
+            <a:endCxn id="123" idx="3"/>
+          </p:cNvCxnSpPr>
+          <p:nvPr/>
+        </p:nvCxnSpPr>
+        <p:spPr>
+          <a:xfrm rot="5400000">
+            <a:off x="8624540" y="3822253"/>
+            <a:ext cx="3549069" cy="949238"/>
+          </a:xfrm>
+          <a:prstGeom prst="bentConnector2">
+            <a:avLst/>
+          </a:prstGeom>
+          <a:ln>
+            <a:tailEnd type="triangle"/>
+          </a:ln>
+        </p:spPr>
+        <p:style>
+          <a:lnRef idx="1">
+            <a:schemeClr val="accent1"/>
+          </a:lnRef>
+          <a:fillRef idx="0">
+            <a:schemeClr val="accent1"/>
+          </a:fillRef>
+          <a:effectRef idx="0">
+            <a:schemeClr val="accent1"/>
+          </a:effectRef>
+          <a:fontRef idx="minor">
+            <a:schemeClr val="tx1"/>
+          </a:fontRef>
+        </p:style>
+      </p:cxnSp>
+      <p:sp>
+        <p:nvSpPr>
+          <p:cNvPr id="153" name="Rombo 152"/>
+          <p:cNvSpPr/>
+          <p:nvPr/>
+        </p:nvSpPr>
+        <p:spPr>
+          <a:xfrm>
+            <a:off x="8873837" y="3215260"/>
+            <a:ext cx="224403" cy="273512"/>
+          </a:xfrm>
+          <a:prstGeom prst="diamond">
+            <a:avLst/>
+          </a:prstGeom>
+        </p:spPr>
+        <p:style>
+          <a:lnRef idx="2">
+            <a:schemeClr val="accent1">
+              <a:shade val="50000"/>
+            </a:schemeClr>
+          </a:lnRef>
+          <a:fillRef idx="1">
+            <a:schemeClr val="accent1"/>
+          </a:fillRef>
+          <a:effectRef idx="0">
+            <a:schemeClr val="accent1"/>
+          </a:effectRef>
+          <a:fontRef idx="minor">
+            <a:schemeClr val="lt1"/>
+          </a:fontRef>
+        </p:style>
+        <p:txBody>
+          <a:bodyPr rtlCol="0" anchor="ctr"/>
+          <a:lstStyle/>
+          <a:p>
+            <a:pPr algn="ctr"/>
+            <a:endParaRPr lang="es-CO"/>
+          </a:p>
+        </p:txBody>
+      </p:sp>
+      <p:sp>
+        <p:nvSpPr>
+          <p:cNvPr id="156" name="CuadroTexto 155"/>
+          <p:cNvSpPr txBox="1"/>
+          <p:nvPr/>
+        </p:nvSpPr>
+        <p:spPr>
+          <a:xfrm>
+            <a:off x="9279151" y="3186049"/>
+            <a:ext cx="1069857" cy="215444"/>
+          </a:xfrm>
+          <a:prstGeom prst="rect">
+            <a:avLst/>
+          </a:prstGeom>
+          <a:noFill/>
+        </p:spPr>
+        <p:txBody>
+          <a:bodyPr wrap="square" rtlCol="0">
+            <a:spAutoFit/>
+          </a:bodyPr>
+          <a:lstStyle/>
+          <a:p>
+            <a:r>
+              <a:rPr lang="es-ES" sz="800" dirty="0" smtClean="0"/>
+              <a:t>Es un número?</a:t>
+            </a:r>
+            <a:endParaRPr lang="es-CO" sz="800" dirty="0"/>
+          </a:p>
+        </p:txBody>
+      </p:sp>
+      <p:sp>
+        <p:nvSpPr>
+          <p:cNvPr id="157" name="Rectángulo 156"/>
+          <p:cNvSpPr/>
+          <p:nvPr/>
+        </p:nvSpPr>
+        <p:spPr>
+          <a:xfrm>
+            <a:off x="7777402" y="3943551"/>
+            <a:ext cx="2495700" cy="249140"/>
+          </a:xfrm>
+          <a:prstGeom prst="rect">
+            <a:avLst/>
+          </a:prstGeom>
+        </p:spPr>
+        <p:style>
+          <a:lnRef idx="2">
+            <a:schemeClr val="accent1">
+              <a:shade val="50000"/>
+            </a:schemeClr>
+          </a:lnRef>
+          <a:fillRef idx="1">
+            <a:schemeClr val="accent1"/>
+          </a:fillRef>
+          <a:effectRef idx="0">
+            <a:schemeClr val="accent1"/>
+          </a:effectRef>
+          <a:fontRef idx="minor">
+            <a:schemeClr val="lt1"/>
+          </a:fontRef>
+        </p:style>
+        <p:txBody>
+          <a:bodyPr rtlCol="0" anchor="t"/>
+          <a:lstStyle/>
+          <a:p>
+            <a:pPr algn="ctr"/>
+            <a:r>
+              <a:rPr lang="es-ES" sz="800" dirty="0"/>
+              <a:t>Sonda[</a:t>
+            </a:r>
+            <a:r>
+              <a:rPr lang="es-ES" sz="800" dirty="0" err="1"/>
+              <a:t>ContadorSondas</a:t>
+            </a:r>
+            <a:r>
+              <a:rPr lang="es-ES" sz="800" dirty="0"/>
+              <a:t>]= </a:t>
+            </a:r>
+            <a:r>
+              <a:rPr lang="es-ES" sz="800" dirty="0" smtClean="0"/>
+              <a:t>Sonda[]+ tarea[navegador]</a:t>
+            </a:r>
+          </a:p>
+          <a:p>
+            <a:pPr algn="ctr"/>
+            <a:endParaRPr lang="es-ES" sz="800" dirty="0" smtClean="0"/>
+          </a:p>
+        </p:txBody>
+      </p:sp>
+      <p:cxnSp>
+        <p:nvCxnSpPr>
+          <p:cNvPr id="161" name="Conector recto de flecha 160"/>
+          <p:cNvCxnSpPr>
+            <a:stCxn id="153" idx="2"/>
+            <a:endCxn id="157" idx="0"/>
+          </p:cNvCxnSpPr>
+          <p:nvPr/>
+        </p:nvCxnSpPr>
+        <p:spPr>
+          <a:xfrm>
+            <a:off x="8986039" y="3488772"/>
+            <a:ext cx="39213" cy="454779"/>
+          </a:xfrm>
+          <a:prstGeom prst="straightConnector1">
+            <a:avLst/>
+          </a:prstGeom>
+          <a:ln>
+            <a:tailEnd type="triangle"/>
+          </a:ln>
+        </p:spPr>
+        <p:style>
+          <a:lnRef idx="1">
+            <a:schemeClr val="accent1"/>
+          </a:lnRef>
+          <a:fillRef idx="0">
+            <a:schemeClr val="accent1"/>
+          </a:fillRef>
+          <a:effectRef idx="0">
+            <a:schemeClr val="accent1"/>
+          </a:effectRef>
+          <a:fontRef idx="minor">
+            <a:schemeClr val="tx1"/>
+          </a:fontRef>
+        </p:style>
+      </p:cxnSp>
+      <p:sp>
+        <p:nvSpPr>
+          <p:cNvPr id="167" name="CuadroTexto 166"/>
+          <p:cNvSpPr txBox="1"/>
+          <p:nvPr/>
+        </p:nvSpPr>
+        <p:spPr>
+          <a:xfrm>
+            <a:off x="8800522" y="3533987"/>
+            <a:ext cx="464208" cy="215444"/>
+          </a:xfrm>
+          <a:prstGeom prst="rect">
+            <a:avLst/>
+          </a:prstGeom>
+          <a:noFill/>
+        </p:spPr>
+        <p:txBody>
+          <a:bodyPr wrap="square" rtlCol="0">
+            <a:spAutoFit/>
+          </a:bodyPr>
+          <a:lstStyle/>
+          <a:p>
+            <a:r>
+              <a:rPr lang="es-ES" sz="800" dirty="0" smtClean="0"/>
+              <a:t>Si</a:t>
+            </a:r>
+            <a:endParaRPr lang="es-CO" sz="800" dirty="0"/>
+          </a:p>
+        </p:txBody>
+      </p:sp>
+      <p:sp>
+        <p:nvSpPr>
+          <p:cNvPr id="168" name="CuadroTexto 167"/>
+          <p:cNvSpPr txBox="1"/>
+          <p:nvPr/>
+        </p:nvSpPr>
+        <p:spPr>
+          <a:xfrm>
+            <a:off x="9604720" y="3294549"/>
+            <a:ext cx="378405" cy="215444"/>
+          </a:xfrm>
+          <a:prstGeom prst="rect">
+            <a:avLst/>
+          </a:prstGeom>
+          <a:noFill/>
+        </p:spPr>
+        <p:txBody>
+          <a:bodyPr wrap="square" rtlCol="0">
+            <a:spAutoFit/>
+          </a:bodyPr>
+          <a:lstStyle/>
+          <a:p>
+            <a:r>
+              <a:rPr lang="es-ES" sz="800" dirty="0" smtClean="0"/>
+              <a:t>No</a:t>
+            </a:r>
+            <a:endParaRPr lang="es-CO" sz="800" dirty="0"/>
+          </a:p>
+        </p:txBody>
+      </p:sp>
+      <p:cxnSp>
+        <p:nvCxnSpPr>
+          <p:cNvPr id="21" name="Conector angular 20"/>
+          <p:cNvCxnSpPr>
+            <a:stCxn id="157" idx="2"/>
+            <a:endCxn id="123" idx="0"/>
+          </p:cNvCxnSpPr>
+          <p:nvPr/>
+        </p:nvCxnSpPr>
+        <p:spPr>
+          <a:xfrm rot="5400000">
+            <a:off x="8276836" y="4901893"/>
+            <a:ext cx="1457619" cy="39214"/>
+          </a:xfrm>
+          <a:prstGeom prst="bentConnector3">
+            <a:avLst/>
+          </a:prstGeom>
+          <a:ln>
+            <a:tailEnd type="triangle"/>
+          </a:ln>
+        </p:spPr>
+        <p:style>
+          <a:lnRef idx="1">
+            <a:schemeClr val="accent1"/>
+          </a:lnRef>
+          <a:fillRef idx="0">
+            <a:schemeClr val="accent1"/>
+          </a:fillRef>
+          <a:effectRef idx="0">
+            <a:schemeClr val="accent1"/>
+          </a:effectRef>
+          <a:fontRef idx="minor">
+            <a:schemeClr val="tx1"/>
+          </a:fontRef>
+        </p:style>
+      </p:cxnSp>
+      <p:graphicFrame>
+        <p:nvGraphicFramePr>
+          <p:cNvPr id="41" name="Tabla 40"/>
+          <p:cNvGraphicFramePr>
+            <a:graphicFrameLocks noGrp="1"/>
+          </p:cNvGraphicFramePr>
+          <p:nvPr>
+            <p:extLst>
+              <p:ext uri="{D42A27DB-BD31-4B8C-83A1-F6EECF244321}">
+                <p14:modId xmlns:p14="http://schemas.microsoft.com/office/powerpoint/2010/main" val="2494151852"/>
+              </p:ext>
+            </p:extLst>
+          </p:nvPr>
+        </p:nvGraphicFramePr>
+        <p:xfrm>
+          <a:off x="180262" y="1119962"/>
+          <a:ext cx="4851072" cy="1506370"/>
+        </p:xfrm>
+        <a:graphic>
+          <a:graphicData uri="http://schemas.openxmlformats.org/drawingml/2006/table">
+            <a:tbl>
+              <a:tblPr firstRow="1" bandRow="1">
+                <a:tableStyleId>{5C22544A-7EE6-4342-B048-85BDC9FD1C3A}</a:tableStyleId>
+              </a:tblPr>
+              <a:tblGrid>
+                <a:gridCol w="633124"/>
+                <a:gridCol w="214190"/>
+                <a:gridCol w="241671"/>
+                <a:gridCol w="339826"/>
+                <a:gridCol w="374322"/>
+                <a:gridCol w="357074"/>
+                <a:gridCol w="357074"/>
+                <a:gridCol w="357074"/>
+                <a:gridCol w="214190"/>
+                <a:gridCol w="279209"/>
+                <a:gridCol w="312592"/>
+                <a:gridCol w="390242"/>
+                <a:gridCol w="390242"/>
+                <a:gridCol w="390242"/>
+              </a:tblGrid>
+              <a:tr h="250265">
+                <a:tc>
+                  <a:txBody>
+                    <a:bodyPr/>
+                    <a:lstStyle/>
+                    <a:p>
+                      <a:endParaRPr lang="es-CO" sz="800" dirty="0"/>
+                    </a:p>
+                  </a:txBody>
+                  <a:tcPr/>
+                </a:tc>
+                <a:tc>
+                  <a:txBody>
+                    <a:bodyPr/>
+                    <a:lstStyle/>
+                    <a:p>
+                      <a:endParaRPr lang="es-CO" sz="800" dirty="0"/>
+                    </a:p>
+                  </a:txBody>
+                  <a:tcPr/>
+                </a:tc>
+                <a:tc>
+                  <a:txBody>
+                    <a:bodyPr/>
+                    <a:lstStyle/>
+                    <a:p>
+                      <a:endParaRPr lang="es-CO" sz="800" dirty="0"/>
+                    </a:p>
+                  </a:txBody>
+                  <a:tcPr/>
+                </a:tc>
+                <a:tc>
+                  <a:txBody>
+                    <a:bodyPr/>
+                    <a:lstStyle/>
+                    <a:p>
+                      <a:endParaRPr lang="es-CO" sz="800" dirty="0"/>
+                    </a:p>
+                  </a:txBody>
+                  <a:tcPr/>
+                </a:tc>
+                <a:tc>
+                  <a:txBody>
+                    <a:bodyPr/>
+                    <a:lstStyle/>
+                    <a:p>
+                      <a:endParaRPr lang="es-CO" sz="800" dirty="0"/>
+                    </a:p>
+                  </a:txBody>
+                  <a:tcPr/>
+                </a:tc>
+                <a:tc>
+                  <a:txBody>
+                    <a:bodyPr/>
+                    <a:lstStyle/>
+                    <a:p>
+                      <a:endParaRPr lang="es-CO" sz="800" dirty="0"/>
+                    </a:p>
+                  </a:txBody>
+                  <a:tcPr/>
+                </a:tc>
+                <a:tc>
+                  <a:txBody>
+                    <a:bodyPr/>
+                    <a:lstStyle/>
+                    <a:p>
+                      <a:r>
+                        <a:rPr lang="es-ES" sz="800" dirty="0" smtClean="0"/>
+                        <a:t>x</a:t>
+                      </a:r>
+                      <a:endParaRPr lang="es-CO" sz="800" dirty="0"/>
+                    </a:p>
+                  </a:txBody>
+                  <a:tcPr/>
+                </a:tc>
+                <a:tc>
+                  <a:txBody>
+                    <a:bodyPr/>
+                    <a:lstStyle/>
+                    <a:p>
+                      <a:endParaRPr lang="es-CO" sz="800" dirty="0"/>
+                    </a:p>
+                  </a:txBody>
+                  <a:tcPr/>
+                </a:tc>
+                <a:tc>
+                  <a:txBody>
+                    <a:bodyPr/>
+                    <a:lstStyle/>
+                    <a:p>
+                      <a:endParaRPr lang="es-CO" sz="800"/>
+                    </a:p>
+                  </a:txBody>
+                  <a:tcPr/>
+                </a:tc>
+                <a:tc>
+                  <a:txBody>
+                    <a:bodyPr/>
+                    <a:lstStyle/>
+                    <a:p>
+                      <a:endParaRPr lang="es-CO" sz="800"/>
+                    </a:p>
+                  </a:txBody>
+                  <a:tcPr/>
+                </a:tc>
+                <a:tc>
+                  <a:txBody>
+                    <a:bodyPr/>
+                    <a:lstStyle/>
+                    <a:p>
+                      <a:endParaRPr lang="es-CO" sz="800"/>
+                    </a:p>
+                  </a:txBody>
+                  <a:tcPr/>
+                </a:tc>
+                <a:tc>
+                  <a:txBody>
+                    <a:bodyPr/>
+                    <a:lstStyle/>
+                    <a:p>
+                      <a:endParaRPr lang="es-CO" sz="800"/>
+                    </a:p>
+                  </a:txBody>
+                  <a:tcPr/>
+                </a:tc>
+                <a:tc>
+                  <a:txBody>
+                    <a:bodyPr/>
+                    <a:lstStyle/>
+                    <a:p>
+                      <a:endParaRPr lang="es-CO" sz="800"/>
+                    </a:p>
+                  </a:txBody>
+                  <a:tcPr/>
+                </a:tc>
+                <a:tc>
+                  <a:txBody>
+                    <a:bodyPr/>
+                    <a:lstStyle/>
+                    <a:p>
+                      <a:endParaRPr lang="es-CO" sz="800"/>
+                    </a:p>
+                  </a:txBody>
+                  <a:tcPr/>
+                </a:tc>
+              </a:tr>
+              <a:tr h="292192">
+                <a:tc>
+                  <a:txBody>
+                    <a:bodyPr/>
+                    <a:lstStyle/>
+                    <a:p>
+                      <a:pPr marL="0" marR="0" lvl="0" indent="0" algn="l" defTabSz="914400" rtl="0" eaLnBrk="1" fontAlgn="auto" latinLnBrk="0" hangingPunct="1">
+                        <a:lnSpc>
+                          <a:spcPct val="100000"/>
+                        </a:lnSpc>
+                        <a:spcBef>
+                          <a:spcPts val="0"/>
+                        </a:spcBef>
+                        <a:spcAft>
+                          <a:spcPts val="0"/>
+                        </a:spcAft>
+                        <a:buClrTx/>
+                        <a:buSzTx/>
+                        <a:buFontTx/>
+                        <a:buNone/>
+                        <a:tabLst/>
+                        <a:defRPr/>
+                      </a:pPr>
+                      <a:r>
+                        <a:rPr lang="es-ES" sz="800" dirty="0" smtClean="0"/>
+                        <a:t>NAVEGADOR</a:t>
+                      </a:r>
+                      <a:endParaRPr lang="es-CO" sz="800" dirty="0"/>
+                    </a:p>
+                  </a:txBody>
+                  <a:tcPr/>
+                </a:tc>
+                <a:tc>
+                  <a:txBody>
+                    <a:bodyPr/>
+                    <a:lstStyle/>
+                    <a:p>
+                      <a:r>
+                        <a:rPr lang="es-ES" sz="800" dirty="0" smtClean="0"/>
+                        <a:t>0</a:t>
+                      </a:r>
+                      <a:endParaRPr lang="es-CO" sz="800" dirty="0"/>
+                    </a:p>
+                  </a:txBody>
+                  <a:tcPr/>
+                </a:tc>
+                <a:tc>
+                  <a:txBody>
+                    <a:bodyPr/>
+                    <a:lstStyle/>
+                    <a:p>
+                      <a:r>
+                        <a:rPr lang="es-ES" sz="800" dirty="0" smtClean="0"/>
+                        <a:t>1</a:t>
+                      </a:r>
+                      <a:endParaRPr lang="es-CO" sz="800" dirty="0"/>
+                    </a:p>
+                  </a:txBody>
+                  <a:tcPr/>
+                </a:tc>
+                <a:tc>
+                  <a:txBody>
+                    <a:bodyPr/>
+                    <a:lstStyle/>
+                    <a:p>
+                      <a:r>
+                        <a:rPr lang="es-ES" sz="800" dirty="0" smtClean="0"/>
+                        <a:t>2</a:t>
+                      </a:r>
+                      <a:endParaRPr lang="es-CO" sz="800" dirty="0"/>
+                    </a:p>
+                  </a:txBody>
+                  <a:tcPr/>
+                </a:tc>
+                <a:tc>
+                  <a:txBody>
+                    <a:bodyPr/>
+                    <a:lstStyle/>
+                    <a:p>
+                      <a:r>
+                        <a:rPr lang="es-ES" sz="800" dirty="0" smtClean="0"/>
+                        <a:t>3</a:t>
+                      </a:r>
+                      <a:endParaRPr lang="es-CO" sz="800" dirty="0"/>
+                    </a:p>
+                  </a:txBody>
+                  <a:tcPr/>
+                </a:tc>
+                <a:tc>
+                  <a:txBody>
+                    <a:bodyPr/>
+                    <a:lstStyle/>
+                    <a:p>
+                      <a:r>
+                        <a:rPr lang="es-ES" sz="800" dirty="0" smtClean="0"/>
+                        <a:t>4</a:t>
+                      </a:r>
+                      <a:endParaRPr lang="es-CO" sz="800" dirty="0"/>
+                    </a:p>
+                  </a:txBody>
+                  <a:tcPr/>
+                </a:tc>
+                <a:tc>
+                  <a:txBody>
+                    <a:bodyPr/>
+                    <a:lstStyle/>
+                    <a:p>
+                      <a:r>
+                        <a:rPr lang="es-ES" sz="800" dirty="0" smtClean="0"/>
+                        <a:t>5</a:t>
+                      </a:r>
+                      <a:endParaRPr lang="es-CO" sz="800" dirty="0"/>
+                    </a:p>
+                  </a:txBody>
+                  <a:tcPr/>
+                </a:tc>
+                <a:tc>
+                  <a:txBody>
+                    <a:bodyPr/>
+                    <a:lstStyle/>
+                    <a:p>
+                      <a:r>
+                        <a:rPr lang="es-ES" sz="800" dirty="0" smtClean="0"/>
+                        <a:t>6</a:t>
+                      </a:r>
+                      <a:endParaRPr lang="es-CO" sz="800" dirty="0"/>
+                    </a:p>
+                  </a:txBody>
+                  <a:tcPr/>
+                </a:tc>
+                <a:tc>
+                  <a:txBody>
+                    <a:bodyPr/>
+                    <a:lstStyle/>
+                    <a:p>
+                      <a:r>
+                        <a:rPr lang="es-ES" sz="800" dirty="0" smtClean="0"/>
+                        <a:t>7</a:t>
+                      </a:r>
+                      <a:endParaRPr lang="es-CO" sz="800" dirty="0"/>
+                    </a:p>
+                  </a:txBody>
+                  <a:tcPr/>
+                </a:tc>
+                <a:tc>
+                  <a:txBody>
+                    <a:bodyPr/>
+                    <a:lstStyle/>
+                    <a:p>
+                      <a:r>
+                        <a:rPr lang="es-ES" sz="800" dirty="0" smtClean="0"/>
+                        <a:t>8</a:t>
+                      </a:r>
+                      <a:endParaRPr lang="es-CO" sz="800" dirty="0"/>
+                    </a:p>
+                  </a:txBody>
+                  <a:tcPr/>
+                </a:tc>
+                <a:tc>
+                  <a:txBody>
+                    <a:bodyPr/>
+                    <a:lstStyle/>
+                    <a:p>
+                      <a:r>
+                        <a:rPr lang="es-ES" sz="800" dirty="0" smtClean="0"/>
+                        <a:t>9</a:t>
+                      </a:r>
+                      <a:endParaRPr lang="es-CO" sz="800" dirty="0"/>
+                    </a:p>
+                  </a:txBody>
+                  <a:tcPr/>
+                </a:tc>
+                <a:tc>
+                  <a:txBody>
+                    <a:bodyPr/>
+                    <a:lstStyle/>
+                    <a:p>
+                      <a:r>
+                        <a:rPr lang="es-ES" sz="800" dirty="0" smtClean="0"/>
+                        <a:t>10</a:t>
+                      </a:r>
+                      <a:endParaRPr lang="es-CO" sz="800" dirty="0"/>
+                    </a:p>
+                  </a:txBody>
+                  <a:tcPr/>
+                </a:tc>
+                <a:tc>
+                  <a:txBody>
+                    <a:bodyPr/>
+                    <a:lstStyle/>
+                    <a:p>
+                      <a:r>
+                        <a:rPr lang="es-ES" sz="800" dirty="0" smtClean="0"/>
+                        <a:t>11</a:t>
+                      </a:r>
+                      <a:endParaRPr lang="es-CO" sz="800" dirty="0"/>
+                    </a:p>
+                  </a:txBody>
+                  <a:tcPr/>
+                </a:tc>
+                <a:tc>
+                  <a:txBody>
+                    <a:bodyPr/>
+                    <a:lstStyle/>
+                    <a:p>
+                      <a:endParaRPr lang="es-CO" sz="800" dirty="0"/>
+                    </a:p>
+                  </a:txBody>
+                  <a:tcPr/>
+                </a:tc>
+              </a:tr>
+              <a:tr h="250265">
+                <a:tc>
+                  <a:txBody>
+                    <a:bodyPr/>
+                    <a:lstStyle/>
+                    <a:p>
+                      <a:r>
+                        <a:rPr lang="es-ES" sz="800" dirty="0" smtClean="0"/>
+                        <a:t>TAREA</a:t>
+                      </a:r>
+                      <a:endParaRPr lang="es-CO" sz="800" dirty="0"/>
+                    </a:p>
+                  </a:txBody>
+                  <a:tcPr/>
+                </a:tc>
+                <a:tc>
+                  <a:txBody>
+                    <a:bodyPr/>
+                    <a:lstStyle/>
+                    <a:p>
+                      <a:r>
+                        <a:rPr lang="es-ES" sz="800" dirty="0" smtClean="0"/>
+                        <a:t>t</a:t>
+                      </a:r>
+                      <a:endParaRPr lang="es-CO" sz="800" dirty="0"/>
+                    </a:p>
+                  </a:txBody>
+                  <a:tcPr/>
+                </a:tc>
+                <a:tc>
+                  <a:txBody>
+                    <a:bodyPr/>
+                    <a:lstStyle/>
+                    <a:p>
+                      <a:r>
+                        <a:rPr lang="es-ES" sz="800" dirty="0" smtClean="0"/>
+                        <a:t>i</a:t>
+                      </a:r>
+                      <a:endParaRPr lang="es-CO" sz="800" dirty="0"/>
+                    </a:p>
+                  </a:txBody>
+                  <a:tcPr/>
+                </a:tc>
+                <a:tc>
+                  <a:txBody>
+                    <a:bodyPr/>
+                    <a:lstStyle/>
+                    <a:p>
+                      <a:r>
+                        <a:rPr lang="es-ES" sz="800" dirty="0" smtClean="0"/>
+                        <a:t>g</a:t>
+                      </a:r>
+                      <a:endParaRPr lang="es-CO" sz="800" dirty="0"/>
+                    </a:p>
+                  </a:txBody>
+                  <a:tcPr/>
+                </a:tc>
+                <a:tc>
+                  <a:txBody>
+                    <a:bodyPr/>
+                    <a:lstStyle/>
+                    <a:p>
+                      <a:r>
+                        <a:rPr lang="es-ES" sz="800" dirty="0" smtClean="0"/>
+                        <a:t>o</a:t>
+                      </a:r>
+                      <a:endParaRPr lang="es-CO" sz="800" dirty="0"/>
+                    </a:p>
+                  </a:txBody>
+                  <a:tcPr/>
+                </a:tc>
+                <a:tc>
+                  <a:txBody>
+                    <a:bodyPr/>
+                    <a:lstStyle/>
+                    <a:p>
+                      <a:r>
+                        <a:rPr lang="es-ES" sz="800" dirty="0" smtClean="0"/>
+                        <a:t>b</a:t>
+                      </a:r>
+                      <a:endParaRPr lang="es-CO" sz="800" dirty="0"/>
+                    </a:p>
+                  </a:txBody>
+                  <a:tcPr/>
+                </a:tc>
+                <a:tc>
+                  <a:txBody>
+                    <a:bodyPr/>
+                    <a:lstStyle/>
+                    <a:p>
+                      <a:r>
+                        <a:rPr lang="es-ES" sz="800" dirty="0" smtClean="0"/>
+                        <a:t>o</a:t>
+                      </a:r>
+                      <a:endParaRPr lang="es-CO" sz="800" dirty="0"/>
+                    </a:p>
+                  </a:txBody>
+                  <a:tcPr/>
+                </a:tc>
+                <a:tc>
+                  <a:txBody>
+                    <a:bodyPr/>
+                    <a:lstStyle/>
+                    <a:p>
+                      <a:r>
+                        <a:rPr lang="es-ES" sz="800" dirty="0" smtClean="0"/>
+                        <a:t>-</a:t>
+                      </a:r>
+                      <a:endParaRPr lang="es-CO" sz="800" dirty="0"/>
+                    </a:p>
+                  </a:txBody>
+                  <a:tcPr/>
+                </a:tc>
+                <a:tc>
+                  <a:txBody>
+                    <a:bodyPr/>
+                    <a:lstStyle/>
+                    <a:p>
+                      <a:r>
+                        <a:rPr lang="es-ES" sz="800" dirty="0" smtClean="0"/>
+                        <a:t>2</a:t>
+                      </a:r>
+                      <a:endParaRPr lang="es-CO" sz="800" dirty="0"/>
+                    </a:p>
+                  </a:txBody>
+                  <a:tcPr/>
+                </a:tc>
+                <a:tc>
+                  <a:txBody>
+                    <a:bodyPr/>
+                    <a:lstStyle/>
+                    <a:p>
+                      <a:r>
+                        <a:rPr lang="es-ES" sz="800" dirty="0" smtClean="0"/>
+                        <a:t>2</a:t>
+                      </a:r>
+                      <a:endParaRPr lang="es-CO" sz="800" dirty="0"/>
+                    </a:p>
+                  </a:txBody>
+                  <a:tcPr/>
+                </a:tc>
+                <a:tc>
+                  <a:txBody>
+                    <a:bodyPr/>
+                    <a:lstStyle/>
+                    <a:p>
+                      <a:r>
+                        <a:rPr lang="es-ES" sz="800" dirty="0" smtClean="0"/>
+                        <a:t>3</a:t>
+                      </a:r>
+                      <a:endParaRPr lang="es-CO" sz="800" dirty="0"/>
+                    </a:p>
+                  </a:txBody>
+                  <a:tcPr/>
+                </a:tc>
+                <a:tc>
+                  <a:txBody>
+                    <a:bodyPr/>
+                    <a:lstStyle/>
+                    <a:p>
+                      <a:r>
+                        <a:rPr lang="es-ES" sz="800" dirty="0" smtClean="0"/>
+                        <a:t>3</a:t>
+                      </a:r>
+                      <a:endParaRPr lang="es-CO" sz="800" dirty="0"/>
+                    </a:p>
+                  </a:txBody>
+                  <a:tcPr/>
+                </a:tc>
+                <a:tc>
+                  <a:txBody>
+                    <a:bodyPr/>
+                    <a:lstStyle/>
+                    <a:p>
+                      <a:r>
+                        <a:rPr lang="es-ES" sz="800" dirty="0" smtClean="0"/>
+                        <a:t>-</a:t>
+                      </a:r>
+                      <a:endParaRPr lang="es-CO" sz="800" dirty="0"/>
+                    </a:p>
+                  </a:txBody>
+                  <a:tcPr/>
+                </a:tc>
+                <a:tc>
+                  <a:txBody>
+                    <a:bodyPr/>
+                    <a:lstStyle/>
+                    <a:p>
+                      <a:endParaRPr lang="es-CO" sz="800" dirty="0"/>
+                    </a:p>
+                  </a:txBody>
+                  <a:tcPr/>
+                </a:tc>
+              </a:tr>
+              <a:tr h="292192">
+                <a:tc>
+                  <a:txBody>
+                    <a:bodyPr/>
+                    <a:lstStyle/>
+                    <a:p>
+                      <a:r>
+                        <a:rPr lang="es-ES" sz="800" dirty="0" smtClean="0"/>
+                        <a:t>CLIENTE</a:t>
+                      </a:r>
+                      <a:endParaRPr lang="es-CO" sz="800" dirty="0"/>
+                    </a:p>
+                  </a:txBody>
+                  <a:tcPr/>
+                </a:tc>
+                <a:tc>
+                  <a:txBody>
+                    <a:bodyPr/>
+                    <a:lstStyle/>
+                    <a:p>
+                      <a:r>
+                        <a:rPr lang="es-ES" sz="800" dirty="0" smtClean="0"/>
+                        <a:t>t</a:t>
+                      </a:r>
+                      <a:endParaRPr lang="es-CO" sz="800" dirty="0"/>
+                    </a:p>
+                  </a:txBody>
+                  <a:tcPr/>
+                </a:tc>
+                <a:tc>
+                  <a:txBody>
+                    <a:bodyPr/>
+                    <a:lstStyle/>
+                    <a:p>
+                      <a:r>
+                        <a:rPr lang="es-ES" sz="800" dirty="0" smtClean="0"/>
+                        <a:t>ti</a:t>
+                      </a:r>
+                      <a:endParaRPr lang="es-CO" sz="800" dirty="0"/>
+                    </a:p>
+                  </a:txBody>
+                  <a:tcPr/>
+                </a:tc>
+                <a:tc>
+                  <a:txBody>
+                    <a:bodyPr/>
+                    <a:lstStyle/>
+                    <a:p>
+                      <a:r>
+                        <a:rPr lang="es-ES" sz="800" dirty="0" err="1" smtClean="0"/>
+                        <a:t>tig</a:t>
+                      </a:r>
+                      <a:endParaRPr lang="es-CO" sz="800" dirty="0"/>
+                    </a:p>
+                  </a:txBody>
+                  <a:tcPr/>
+                </a:tc>
+                <a:tc>
+                  <a:txBody>
+                    <a:bodyPr/>
+                    <a:lstStyle/>
+                    <a:p>
+                      <a:r>
+                        <a:rPr lang="es-ES" sz="800" dirty="0" err="1" smtClean="0"/>
+                        <a:t>tigo</a:t>
+                      </a:r>
+                      <a:endParaRPr lang="es-CO" sz="800" dirty="0"/>
+                    </a:p>
+                  </a:txBody>
+                  <a:tcPr/>
+                </a:tc>
+                <a:tc>
+                  <a:txBody>
+                    <a:bodyPr/>
+                    <a:lstStyle/>
+                    <a:p>
+                      <a:r>
+                        <a:rPr lang="es-ES" sz="800" dirty="0" err="1" smtClean="0"/>
+                        <a:t>tigob</a:t>
+                      </a:r>
+                      <a:endParaRPr lang="es-CO" sz="800" dirty="0"/>
+                    </a:p>
+                  </a:txBody>
+                  <a:tcPr/>
+                </a:tc>
+                <a:tc>
+                  <a:txBody>
+                    <a:bodyPr/>
+                    <a:lstStyle/>
+                    <a:p>
+                      <a:r>
+                        <a:rPr lang="es-ES" sz="800" dirty="0" err="1" smtClean="0"/>
+                        <a:t>tigobo</a:t>
+                      </a:r>
+                      <a:endParaRPr lang="es-CO" sz="800" dirty="0"/>
+                    </a:p>
+                  </a:txBody>
+                  <a:tcPr/>
+                </a:tc>
+                <a:tc>
+                  <a:txBody>
+                    <a:bodyPr/>
+                    <a:lstStyle/>
+                    <a:p>
+                      <a:endParaRPr lang="es-CO" sz="800" dirty="0"/>
+                    </a:p>
+                  </a:txBody>
+                  <a:tcPr/>
+                </a:tc>
+                <a:tc>
+                  <a:txBody>
+                    <a:bodyPr/>
+                    <a:lstStyle/>
+                    <a:p>
+                      <a:endParaRPr lang="es-CO" sz="800" dirty="0"/>
+                    </a:p>
+                  </a:txBody>
+                  <a:tcPr/>
+                </a:tc>
+                <a:tc>
+                  <a:txBody>
+                    <a:bodyPr/>
+                    <a:lstStyle/>
+                    <a:p>
+                      <a:endParaRPr lang="es-CO" sz="800" dirty="0"/>
+                    </a:p>
+                  </a:txBody>
+                  <a:tcPr/>
+                </a:tc>
+                <a:tc>
+                  <a:txBody>
+                    <a:bodyPr/>
+                    <a:lstStyle/>
+                    <a:p>
+                      <a:endParaRPr lang="es-CO" sz="800" dirty="0"/>
+                    </a:p>
+                  </a:txBody>
+                  <a:tcPr/>
+                </a:tc>
+                <a:tc>
+                  <a:txBody>
+                    <a:bodyPr/>
+                    <a:lstStyle/>
+                    <a:p>
+                      <a:endParaRPr lang="es-CO" sz="800" dirty="0"/>
+                    </a:p>
+                  </a:txBody>
+                  <a:tcPr/>
+                </a:tc>
+                <a:tc>
+                  <a:txBody>
+                    <a:bodyPr/>
+                    <a:lstStyle/>
+                    <a:p>
+                      <a:endParaRPr lang="es-CO" sz="800" dirty="0"/>
+                    </a:p>
+                  </a:txBody>
+                  <a:tcPr/>
+                </a:tc>
+                <a:tc>
+                  <a:txBody>
+                    <a:bodyPr/>
+                    <a:lstStyle/>
+                    <a:p>
+                      <a:endParaRPr lang="es-CO" sz="800" dirty="0"/>
+                    </a:p>
+                  </a:txBody>
+                  <a:tcPr/>
+                </a:tc>
+              </a:tr>
+              <a:tr h="292192">
+                <a:tc>
+                  <a:txBody>
+                    <a:bodyPr/>
+                    <a:lstStyle/>
+                    <a:p>
+                      <a:r>
+                        <a:rPr lang="es-ES" sz="800" dirty="0" smtClean="0"/>
+                        <a:t>sonda</a:t>
+                      </a:r>
+                      <a:endParaRPr lang="es-CO" sz="800" dirty="0"/>
+                    </a:p>
+                  </a:txBody>
+                  <a:tcPr/>
+                </a:tc>
+                <a:tc>
+                  <a:txBody>
+                    <a:bodyPr/>
+                    <a:lstStyle/>
+                    <a:p>
+                      <a:endParaRPr lang="es-CO" sz="800" dirty="0"/>
+                    </a:p>
+                  </a:txBody>
+                  <a:tcPr/>
+                </a:tc>
+                <a:tc>
+                  <a:txBody>
+                    <a:bodyPr/>
+                    <a:lstStyle/>
+                    <a:p>
+                      <a:endParaRPr lang="es-CO" sz="800"/>
+                    </a:p>
+                  </a:txBody>
+                  <a:tcPr/>
+                </a:tc>
+                <a:tc>
+                  <a:txBody>
+                    <a:bodyPr/>
+                    <a:lstStyle/>
+                    <a:p>
+                      <a:endParaRPr lang="es-CO" sz="800"/>
+                    </a:p>
+                  </a:txBody>
+                  <a:tcPr/>
+                </a:tc>
+                <a:tc>
+                  <a:txBody>
+                    <a:bodyPr/>
+                    <a:lstStyle/>
+                    <a:p>
+                      <a:endParaRPr lang="es-CO" sz="800"/>
+                    </a:p>
+                  </a:txBody>
+                  <a:tcPr/>
+                </a:tc>
+                <a:tc>
+                  <a:txBody>
+                    <a:bodyPr/>
+                    <a:lstStyle/>
+                    <a:p>
+                      <a:endParaRPr lang="es-CO" sz="800"/>
+                    </a:p>
+                  </a:txBody>
+                  <a:tcPr/>
+                </a:tc>
+                <a:tc>
+                  <a:txBody>
+                    <a:bodyPr/>
+                    <a:lstStyle/>
+                    <a:p>
+                      <a:endParaRPr lang="es-CO" sz="800" dirty="0"/>
+                    </a:p>
+                  </a:txBody>
+                  <a:tcPr/>
+                </a:tc>
+                <a:tc>
+                  <a:txBody>
+                    <a:bodyPr/>
+                    <a:lstStyle/>
+                    <a:p>
+                      <a:endParaRPr lang="es-CO" sz="800"/>
+                    </a:p>
+                  </a:txBody>
+                  <a:tcPr/>
+                </a:tc>
+                <a:tc>
+                  <a:txBody>
+                    <a:bodyPr/>
+                    <a:lstStyle/>
+                    <a:p>
+                      <a:r>
+                        <a:rPr lang="es-ES" sz="800" dirty="0" smtClean="0"/>
+                        <a:t>2</a:t>
+                      </a:r>
+                      <a:endParaRPr lang="es-CO" sz="800" dirty="0"/>
+                    </a:p>
+                  </a:txBody>
+                  <a:tcPr/>
+                </a:tc>
+                <a:tc>
+                  <a:txBody>
+                    <a:bodyPr/>
+                    <a:lstStyle/>
+                    <a:p>
+                      <a:r>
+                        <a:rPr lang="es-ES" sz="800" dirty="0" smtClean="0"/>
+                        <a:t>22</a:t>
+                      </a:r>
+                      <a:endParaRPr lang="es-CO" sz="800" dirty="0"/>
+                    </a:p>
+                  </a:txBody>
+                  <a:tcPr/>
+                </a:tc>
+                <a:tc>
+                  <a:txBody>
+                    <a:bodyPr/>
+                    <a:lstStyle/>
+                    <a:p>
+                      <a:r>
+                        <a:rPr lang="es-ES" sz="800" dirty="0" smtClean="0"/>
+                        <a:t>223</a:t>
+                      </a:r>
+                      <a:endParaRPr lang="es-CO" sz="800" dirty="0"/>
+                    </a:p>
+                  </a:txBody>
+                  <a:tcPr/>
+                </a:tc>
+                <a:tc>
+                  <a:txBody>
+                    <a:bodyPr/>
+                    <a:lstStyle/>
+                    <a:p>
+                      <a:r>
+                        <a:rPr lang="es-ES" sz="800" dirty="0" smtClean="0"/>
+                        <a:t>2233</a:t>
+                      </a:r>
+                      <a:endParaRPr lang="es-CO" sz="800" dirty="0"/>
+                    </a:p>
+                  </a:txBody>
+                  <a:tcPr/>
+                </a:tc>
+                <a:tc>
+                  <a:txBody>
+                    <a:bodyPr/>
+                    <a:lstStyle/>
+                    <a:p>
+                      <a:endParaRPr lang="es-CO" sz="800" dirty="0"/>
+                    </a:p>
+                  </a:txBody>
+                  <a:tcPr/>
+                </a:tc>
+                <a:tc>
+                  <a:txBody>
+                    <a:bodyPr/>
+                    <a:lstStyle/>
+                    <a:p>
+                      <a:endParaRPr lang="es-CO" sz="800" dirty="0"/>
+                    </a:p>
+                  </a:txBody>
+                  <a:tcPr/>
+                </a:tc>
+              </a:tr>
+            </a:tbl>
+          </a:graphicData>
+        </a:graphic>
+      </p:graphicFrame>
+      <p:sp>
+        <p:nvSpPr>
+          <p:cNvPr id="110" name="Rombo 109"/>
+          <p:cNvSpPr/>
+          <p:nvPr/>
+        </p:nvSpPr>
+        <p:spPr>
+          <a:xfrm>
+            <a:off x="7888801" y="1873455"/>
+            <a:ext cx="313899" cy="341194"/>
+          </a:xfrm>
+          <a:prstGeom prst="diamond">
+            <a:avLst/>
+          </a:prstGeom>
+        </p:spPr>
+        <p:style>
+          <a:lnRef idx="2">
+            <a:schemeClr val="accent1">
+              <a:shade val="50000"/>
+            </a:schemeClr>
+          </a:lnRef>
+          <a:fillRef idx="1">
+            <a:schemeClr val="accent1"/>
+          </a:fillRef>
+          <a:effectRef idx="0">
+            <a:schemeClr val="accent1"/>
+          </a:effectRef>
+          <a:fontRef idx="minor">
+            <a:schemeClr val="lt1"/>
+          </a:fontRef>
+        </p:style>
+        <p:txBody>
+          <a:bodyPr rtlCol="0" anchor="ctr"/>
+          <a:lstStyle/>
+          <a:p>
+            <a:pPr algn="ctr"/>
+            <a:endParaRPr lang="es-CO"/>
+          </a:p>
+        </p:txBody>
+      </p:sp>
+      <p:cxnSp>
+        <p:nvCxnSpPr>
+          <p:cNvPr id="82" name="Conector recto de flecha 81"/>
+          <p:cNvCxnSpPr>
+            <a:stCxn id="13" idx="2"/>
+            <a:endCxn id="110" idx="0"/>
+          </p:cNvCxnSpPr>
+          <p:nvPr/>
+        </p:nvCxnSpPr>
+        <p:spPr>
+          <a:xfrm flipH="1">
+            <a:off x="8045751" y="1413492"/>
+            <a:ext cx="10126" cy="459963"/>
+          </a:xfrm>
+          <a:prstGeom prst="straightConnector1">
+            <a:avLst/>
+          </a:prstGeom>
+          <a:ln>
+            <a:tailEnd type="triangle"/>
+          </a:ln>
+        </p:spPr>
+        <p:style>
+          <a:lnRef idx="1">
+            <a:schemeClr val="accent1"/>
+          </a:lnRef>
+          <a:fillRef idx="0">
+            <a:schemeClr val="accent1"/>
+          </a:fillRef>
+          <a:effectRef idx="0">
+            <a:schemeClr val="accent1"/>
+          </a:effectRef>
+          <a:fontRef idx="minor">
+            <a:schemeClr val="tx1"/>
+          </a:fontRef>
+        </p:style>
+      </p:cxnSp>
+      <p:sp>
+        <p:nvSpPr>
+          <p:cNvPr id="88" name="CuadroTexto 87"/>
+          <p:cNvSpPr txBox="1"/>
+          <p:nvPr/>
+        </p:nvSpPr>
+        <p:spPr>
+          <a:xfrm>
+            <a:off x="6535837" y="1487689"/>
+            <a:ext cx="1598515" cy="338554"/>
+          </a:xfrm>
+          <a:prstGeom prst="rect">
+            <a:avLst/>
+          </a:prstGeom>
+          <a:noFill/>
+        </p:spPr>
+        <p:txBody>
+          <a:bodyPr wrap="none" rtlCol="0">
+            <a:spAutoFit/>
+          </a:bodyPr>
+          <a:lstStyle/>
+          <a:p>
+            <a:r>
+              <a:rPr lang="es-ES" sz="800" dirty="0" smtClean="0"/>
+              <a:t>¿Ya se llegó al último carácter?</a:t>
+            </a:r>
+          </a:p>
+          <a:p>
+            <a:r>
+              <a:rPr lang="es-ES" sz="800" dirty="0" smtClean="0"/>
+              <a:t>Navegador==Longitud de la tarea</a:t>
+            </a:r>
+            <a:endParaRPr lang="es-CO" sz="800" dirty="0"/>
+          </a:p>
+        </p:txBody>
+      </p:sp>
+      <p:sp>
+        <p:nvSpPr>
+          <p:cNvPr id="89" name="CuadroTexto 88"/>
+          <p:cNvSpPr txBox="1"/>
+          <p:nvPr/>
+        </p:nvSpPr>
+        <p:spPr>
+          <a:xfrm>
+            <a:off x="8978751" y="2580764"/>
+            <a:ext cx="362133" cy="261610"/>
+          </a:xfrm>
+          <a:prstGeom prst="rect">
+            <a:avLst/>
+          </a:prstGeom>
+          <a:noFill/>
+        </p:spPr>
+        <p:txBody>
+          <a:bodyPr wrap="square" rtlCol="0">
+            <a:spAutoFit/>
+          </a:bodyPr>
+          <a:lstStyle/>
+          <a:p>
+            <a:r>
+              <a:rPr lang="es-ES" sz="1100" dirty="0" smtClean="0"/>
+              <a:t>No</a:t>
+            </a:r>
+            <a:endParaRPr lang="es-CO" sz="1100" dirty="0"/>
+          </a:p>
+        </p:txBody>
+      </p:sp>
+      <p:cxnSp>
+        <p:nvCxnSpPr>
+          <p:cNvPr id="120" name="Conector angular 119"/>
+          <p:cNvCxnSpPr>
+            <a:stCxn id="110" idx="3"/>
+            <a:endCxn id="81" idx="0"/>
+          </p:cNvCxnSpPr>
+          <p:nvPr/>
+        </p:nvCxnSpPr>
+        <p:spPr>
+          <a:xfrm>
+            <a:off x="8202700" y="2044052"/>
+            <a:ext cx="783339" cy="164761"/>
+          </a:xfrm>
+          <a:prstGeom prst="bentConnector2">
+            <a:avLst/>
+          </a:prstGeom>
+          <a:ln>
+            <a:tailEnd type="triangle"/>
+          </a:ln>
+        </p:spPr>
+        <p:style>
+          <a:lnRef idx="1">
+            <a:schemeClr val="accent1"/>
+          </a:lnRef>
+          <a:fillRef idx="0">
+            <a:schemeClr val="accent1"/>
+          </a:fillRef>
+          <a:effectRef idx="0">
+            <a:schemeClr val="accent1"/>
+          </a:effectRef>
+          <a:fontRef idx="minor">
+            <a:schemeClr val="tx1"/>
+          </a:fontRef>
+        </p:style>
+      </p:cxnSp>
+      <p:cxnSp>
+        <p:nvCxnSpPr>
+          <p:cNvPr id="141" name="Conector recto de flecha 140"/>
+          <p:cNvCxnSpPr>
+            <a:stCxn id="81" idx="2"/>
+            <a:endCxn id="153" idx="0"/>
+          </p:cNvCxnSpPr>
+          <p:nvPr/>
+        </p:nvCxnSpPr>
+        <p:spPr>
+          <a:xfrm>
+            <a:off x="8986039" y="2470573"/>
+            <a:ext cx="0" cy="744687"/>
+          </a:xfrm>
+          <a:prstGeom prst="straightConnector1">
+            <a:avLst/>
+          </a:prstGeom>
+          <a:ln>
+            <a:tailEnd type="triangle"/>
+          </a:ln>
+        </p:spPr>
+        <p:style>
+          <a:lnRef idx="1">
+            <a:schemeClr val="accent1"/>
+          </a:lnRef>
+          <a:fillRef idx="0">
+            <a:schemeClr val="accent1"/>
+          </a:fillRef>
+          <a:effectRef idx="0">
+            <a:schemeClr val="accent1"/>
+          </a:effectRef>
+          <a:fontRef idx="minor">
+            <a:schemeClr val="tx1"/>
+          </a:fontRef>
+        </p:style>
+      </p:cxnSp>
+      <p:cxnSp>
+        <p:nvCxnSpPr>
+          <p:cNvPr id="144" name="Conector recto de flecha 143"/>
+          <p:cNvCxnSpPr/>
+          <p:nvPr/>
+        </p:nvCxnSpPr>
+        <p:spPr>
+          <a:xfrm>
+            <a:off x="9073744" y="3344348"/>
+            <a:ext cx="1044957" cy="7668"/>
+          </a:xfrm>
+          <a:prstGeom prst="straightConnector1">
+            <a:avLst/>
+          </a:prstGeom>
+          <a:ln>
+            <a:tailEnd type="triangle"/>
+          </a:ln>
+        </p:spPr>
+        <p:style>
+          <a:lnRef idx="1">
+            <a:schemeClr val="accent1"/>
+          </a:lnRef>
+          <a:fillRef idx="0">
+            <a:schemeClr val="accent1"/>
+          </a:fillRef>
+          <a:effectRef idx="0">
+            <a:schemeClr val="accent1"/>
+          </a:effectRef>
+          <a:fontRef idx="minor">
+            <a:schemeClr val="tx1"/>
+          </a:fontRef>
+        </p:style>
+      </p:cxnSp>
+      <p:sp>
+        <p:nvSpPr>
+          <p:cNvPr id="174" name="CuadroTexto 173"/>
+          <p:cNvSpPr txBox="1"/>
+          <p:nvPr/>
+        </p:nvSpPr>
+        <p:spPr>
+          <a:xfrm>
+            <a:off x="9976675" y="3579300"/>
+            <a:ext cx="284052" cy="261610"/>
+          </a:xfrm>
+          <a:prstGeom prst="rect">
+            <a:avLst/>
+          </a:prstGeom>
+          <a:noFill/>
+        </p:spPr>
+        <p:txBody>
+          <a:bodyPr wrap="none" rtlCol="0">
+            <a:spAutoFit/>
+          </a:bodyPr>
+          <a:lstStyle/>
+          <a:p>
+            <a:r>
+              <a:rPr lang="es-ES" sz="1100" dirty="0" smtClean="0"/>
+              <a:t>SI</a:t>
+            </a:r>
+            <a:endParaRPr lang="es-CO" sz="1100" dirty="0"/>
+          </a:p>
+        </p:txBody>
+      </p:sp>
+      <p:cxnSp>
+        <p:nvCxnSpPr>
+          <p:cNvPr id="187" name="Conector angular 186"/>
+          <p:cNvCxnSpPr>
+            <a:stCxn id="123" idx="1"/>
+            <a:endCxn id="110" idx="1"/>
+          </p:cNvCxnSpPr>
+          <p:nvPr/>
+        </p:nvCxnSpPr>
+        <p:spPr>
+          <a:xfrm rot="10800000">
+            <a:off x="7888801" y="2044053"/>
+            <a:ext cx="158820" cy="4027355"/>
+          </a:xfrm>
+          <a:prstGeom prst="bentConnector3">
+            <a:avLst>
+              <a:gd name="adj1" fmla="val 243937"/>
+            </a:avLst>
+          </a:prstGeom>
+          <a:ln>
+            <a:tailEnd type="triangle"/>
+          </a:ln>
+        </p:spPr>
+        <p:style>
+          <a:lnRef idx="1">
+            <a:schemeClr val="accent1"/>
+          </a:lnRef>
+          <a:fillRef idx="0">
+            <a:schemeClr val="accent1"/>
+          </a:fillRef>
+          <a:effectRef idx="0">
+            <a:schemeClr val="accent1"/>
+          </a:effectRef>
+          <a:fontRef idx="minor">
+            <a:schemeClr val="tx1"/>
+          </a:fontRef>
+        </p:style>
+      </p:cxnSp>
+      <p:sp>
+        <p:nvSpPr>
+          <p:cNvPr id="189" name="Rectángulo 188"/>
+          <p:cNvSpPr/>
+          <p:nvPr/>
+        </p:nvSpPr>
+        <p:spPr>
+          <a:xfrm>
+            <a:off x="10349008" y="3627109"/>
+            <a:ext cx="477459" cy="226235"/>
+          </a:xfrm>
+          <a:prstGeom prst="rect">
+            <a:avLst/>
+          </a:prstGeom>
+        </p:spPr>
+        <p:style>
+          <a:lnRef idx="2">
+            <a:schemeClr val="accent1">
+              <a:shade val="50000"/>
+            </a:schemeClr>
+          </a:lnRef>
+          <a:fillRef idx="1">
+            <a:schemeClr val="accent1"/>
+          </a:fillRef>
+          <a:effectRef idx="0">
+            <a:schemeClr val="accent1"/>
+          </a:effectRef>
+          <a:fontRef idx="minor">
+            <a:schemeClr val="lt1"/>
+          </a:fontRef>
+        </p:style>
+        <p:txBody>
+          <a:bodyPr rtlCol="0" anchor="ctr"/>
+          <a:lstStyle/>
+          <a:p>
+            <a:pPr algn="ctr"/>
+            <a:r>
+              <a:rPr lang="es-ES" sz="600" dirty="0" smtClean="0"/>
+              <a:t>Carácter inválido</a:t>
+            </a:r>
+            <a:endParaRPr lang="es-CO" sz="600" dirty="0"/>
+          </a:p>
+        </p:txBody>
+      </p:sp>
+      <p:cxnSp>
+        <p:nvCxnSpPr>
+          <p:cNvPr id="191" name="Conector angular 190"/>
+          <p:cNvCxnSpPr>
+            <a:stCxn id="16" idx="3"/>
+            <a:endCxn id="189" idx="0"/>
+          </p:cNvCxnSpPr>
+          <p:nvPr/>
+        </p:nvCxnSpPr>
+        <p:spPr>
+          <a:xfrm>
+            <a:off x="10396233" y="3352016"/>
+            <a:ext cx="191505" cy="275093"/>
+          </a:xfrm>
+          <a:prstGeom prst="bentConnector2">
+            <a:avLst/>
+          </a:prstGeom>
+          <a:ln>
+            <a:tailEnd type="triangle"/>
+          </a:ln>
+        </p:spPr>
+        <p:style>
+          <a:lnRef idx="1">
+            <a:schemeClr val="accent1"/>
+          </a:lnRef>
+          <a:fillRef idx="0">
+            <a:schemeClr val="accent1"/>
+          </a:fillRef>
+          <a:effectRef idx="0">
+            <a:schemeClr val="accent1"/>
+          </a:effectRef>
+          <a:fontRef idx="minor">
+            <a:schemeClr val="tx1"/>
+          </a:fontRef>
+        </p:style>
+      </p:cxnSp>
+      <p:sp>
+        <p:nvSpPr>
+          <p:cNvPr id="192" name="CuadroTexto 191"/>
+          <p:cNvSpPr txBox="1"/>
+          <p:nvPr/>
+        </p:nvSpPr>
+        <p:spPr>
+          <a:xfrm>
+            <a:off x="10369588" y="3189244"/>
+            <a:ext cx="378405" cy="215444"/>
+          </a:xfrm>
+          <a:prstGeom prst="rect">
+            <a:avLst/>
+          </a:prstGeom>
+          <a:noFill/>
+        </p:spPr>
+        <p:txBody>
+          <a:bodyPr wrap="square" rtlCol="0">
+            <a:spAutoFit/>
+          </a:bodyPr>
+          <a:lstStyle/>
+          <a:p>
+            <a:r>
+              <a:rPr lang="es-ES" sz="800" dirty="0" smtClean="0"/>
+              <a:t>No</a:t>
+            </a:r>
+            <a:endParaRPr lang="es-CO" sz="800" dirty="0"/>
+          </a:p>
+        </p:txBody>
+      </p:sp>
+      <p:sp>
+        <p:nvSpPr>
+          <p:cNvPr id="204" name="Rectángulo 203"/>
+          <p:cNvSpPr/>
+          <p:nvPr/>
+        </p:nvSpPr>
+        <p:spPr>
+          <a:xfrm>
+            <a:off x="9133676" y="4825465"/>
+            <a:ext cx="1105824" cy="249140"/>
+          </a:xfrm>
+          <a:prstGeom prst="rect">
+            <a:avLst/>
+          </a:prstGeom>
+        </p:spPr>
+        <p:style>
+          <a:lnRef idx="2">
+            <a:schemeClr val="accent1">
+              <a:shade val="50000"/>
+            </a:schemeClr>
+          </a:lnRef>
+          <a:fillRef idx="1">
+            <a:schemeClr val="accent1"/>
+          </a:fillRef>
+          <a:effectRef idx="0">
+            <a:schemeClr val="accent1"/>
+          </a:effectRef>
+          <a:fontRef idx="minor">
+            <a:schemeClr val="lt1"/>
+          </a:fontRef>
+        </p:style>
+        <p:txBody>
+          <a:bodyPr rtlCol="0" anchor="t"/>
+          <a:lstStyle/>
+          <a:p>
+            <a:pPr algn="ctr"/>
+            <a:r>
+              <a:rPr lang="es-ES" sz="800" dirty="0" err="1" smtClean="0"/>
+              <a:t>ContadorSondas</a:t>
+            </a:r>
+            <a:r>
+              <a:rPr lang="es-ES" sz="800" dirty="0" smtClean="0"/>
+              <a:t>+=</a:t>
+            </a:r>
+          </a:p>
+          <a:p>
+            <a:pPr algn="ctr"/>
+            <a:endParaRPr lang="es-ES" sz="800" dirty="0" smtClean="0"/>
+          </a:p>
+        </p:txBody>
+      </p:sp>
+      <p:cxnSp>
+        <p:nvCxnSpPr>
+          <p:cNvPr id="208" name="Conector angular 207"/>
+          <p:cNvCxnSpPr>
+            <a:stCxn id="204" idx="2"/>
+            <a:endCxn id="123" idx="3"/>
+          </p:cNvCxnSpPr>
+          <p:nvPr/>
+        </p:nvCxnSpPr>
+        <p:spPr>
+          <a:xfrm rot="16200000" flipH="1">
+            <a:off x="9307120" y="5454072"/>
+            <a:ext cx="996802" cy="237867"/>
+          </a:xfrm>
+          <a:prstGeom prst="bentConnector4">
+            <a:avLst>
+              <a:gd name="adj1" fmla="val 28878"/>
+              <a:gd name="adj2" fmla="val 328550"/>
+            </a:avLst>
+          </a:prstGeom>
+          <a:ln>
+            <a:tailEnd type="triangle"/>
+          </a:ln>
+        </p:spPr>
+        <p:style>
+          <a:lnRef idx="1">
+            <a:schemeClr val="accent1"/>
+          </a:lnRef>
+          <a:fillRef idx="0">
+            <a:schemeClr val="accent1"/>
+          </a:fillRef>
+          <a:effectRef idx="0">
+            <a:schemeClr val="accent1"/>
+          </a:effectRef>
+          <a:fontRef idx="minor">
+            <a:schemeClr val="tx1"/>
+          </a:fontRef>
+        </p:style>
+      </p:cxnSp>
+      <p:sp>
+        <p:nvSpPr>
+          <p:cNvPr id="211" name="Rombo 210"/>
+          <p:cNvSpPr/>
+          <p:nvPr/>
+        </p:nvSpPr>
+        <p:spPr>
+          <a:xfrm>
+            <a:off x="10124401" y="4382434"/>
+            <a:ext cx="224403" cy="273512"/>
+          </a:xfrm>
+          <a:prstGeom prst="diamond">
+            <a:avLst/>
+          </a:prstGeom>
+        </p:spPr>
+        <p:style>
+          <a:lnRef idx="2">
+            <a:schemeClr val="accent1">
+              <a:shade val="50000"/>
+            </a:schemeClr>
+          </a:lnRef>
+          <a:fillRef idx="1">
+            <a:schemeClr val="accent1"/>
+          </a:fillRef>
+          <a:effectRef idx="0">
+            <a:schemeClr val="accent1"/>
+          </a:effectRef>
+          <a:fontRef idx="minor">
+            <a:schemeClr val="lt1"/>
+          </a:fontRef>
+        </p:style>
+        <p:txBody>
+          <a:bodyPr rtlCol="0" anchor="ctr"/>
+          <a:lstStyle/>
+          <a:p>
+            <a:pPr algn="ctr"/>
+            <a:endParaRPr lang="es-CO"/>
+          </a:p>
+        </p:txBody>
+      </p:sp>
+      <p:cxnSp>
+        <p:nvCxnSpPr>
+          <p:cNvPr id="213" name="Conector recto de flecha 212"/>
+          <p:cNvCxnSpPr>
+            <a:stCxn id="16" idx="2"/>
+            <a:endCxn id="211" idx="0"/>
+          </p:cNvCxnSpPr>
+          <p:nvPr/>
+        </p:nvCxnSpPr>
+        <p:spPr>
+          <a:xfrm flipH="1">
+            <a:off x="10236603" y="3522613"/>
+            <a:ext cx="2681" cy="859821"/>
+          </a:xfrm>
+          <a:prstGeom prst="straightConnector1">
+            <a:avLst/>
+          </a:prstGeom>
+          <a:ln>
+            <a:tailEnd type="triangle"/>
+          </a:ln>
+        </p:spPr>
+        <p:style>
+          <a:lnRef idx="1">
+            <a:schemeClr val="accent1"/>
+          </a:lnRef>
+          <a:fillRef idx="0">
+            <a:schemeClr val="accent1"/>
+          </a:fillRef>
+          <a:effectRef idx="0">
+            <a:schemeClr val="accent1"/>
+          </a:effectRef>
+          <a:fontRef idx="minor">
+            <a:schemeClr val="tx1"/>
+          </a:fontRef>
+        </p:style>
+      </p:cxnSp>
+      <p:sp>
+        <p:nvSpPr>
+          <p:cNvPr id="218" name="CuadroTexto 217"/>
+          <p:cNvSpPr txBox="1"/>
+          <p:nvPr/>
+        </p:nvSpPr>
+        <p:spPr>
+          <a:xfrm flipH="1">
+            <a:off x="10273102" y="4253687"/>
+            <a:ext cx="2059095" cy="215444"/>
+          </a:xfrm>
+          <a:prstGeom prst="rect">
+            <a:avLst/>
+          </a:prstGeom>
+          <a:noFill/>
+        </p:spPr>
+        <p:txBody>
+          <a:bodyPr wrap="square" rtlCol="0">
+            <a:spAutoFit/>
+          </a:bodyPr>
+          <a:lstStyle/>
+          <a:p>
+            <a:r>
+              <a:rPr lang="es-ES" sz="800" dirty="0" err="1" smtClean="0"/>
+              <a:t>contadorsonda</a:t>
+            </a:r>
+            <a:r>
+              <a:rPr lang="es-ES" sz="800" dirty="0" smtClean="0"/>
+              <a:t> == 0 &amp;&amp; sonda[0]==0?</a:t>
+            </a:r>
+            <a:endParaRPr lang="es-CO" sz="800" dirty="0"/>
+          </a:p>
+        </p:txBody>
+      </p:sp>
+      <p:cxnSp>
+        <p:nvCxnSpPr>
+          <p:cNvPr id="225" name="Conector angular 224"/>
+          <p:cNvCxnSpPr>
+            <a:stCxn id="211" idx="1"/>
+            <a:endCxn id="204" idx="0"/>
+          </p:cNvCxnSpPr>
+          <p:nvPr/>
+        </p:nvCxnSpPr>
+        <p:spPr>
+          <a:xfrm rot="10800000" flipV="1">
+            <a:off x="9686589" y="4519189"/>
+            <a:ext cx="437813" cy="306275"/>
+          </a:xfrm>
+          <a:prstGeom prst="bentConnector2">
+            <a:avLst/>
+          </a:prstGeom>
+          <a:ln>
+            <a:tailEnd type="triangle"/>
+          </a:ln>
+        </p:spPr>
+        <p:style>
+          <a:lnRef idx="1">
+            <a:schemeClr val="accent1"/>
+          </a:lnRef>
+          <a:fillRef idx="0">
+            <a:schemeClr val="accent1"/>
+          </a:fillRef>
+          <a:effectRef idx="0">
+            <a:schemeClr val="accent1"/>
+          </a:effectRef>
+          <a:fontRef idx="minor">
+            <a:schemeClr val="tx1"/>
+          </a:fontRef>
+        </p:style>
+      </p:cxnSp>
+      <p:cxnSp>
+        <p:nvCxnSpPr>
+          <p:cNvPr id="230" name="Conector angular 229"/>
+          <p:cNvCxnSpPr>
+            <a:stCxn id="211" idx="3"/>
+          </p:cNvCxnSpPr>
+          <p:nvPr/>
+        </p:nvCxnSpPr>
+        <p:spPr>
+          <a:xfrm>
+            <a:off x="10348804" y="4519190"/>
+            <a:ext cx="312846" cy="1552217"/>
+          </a:xfrm>
+          <a:prstGeom prst="bentConnector2">
+            <a:avLst/>
+          </a:prstGeom>
+          <a:ln>
+            <a:tailEnd type="triangle"/>
+          </a:ln>
+        </p:spPr>
+        <p:style>
+          <a:lnRef idx="1">
+            <a:schemeClr val="accent1"/>
+          </a:lnRef>
+          <a:fillRef idx="0">
+            <a:schemeClr val="accent1"/>
+          </a:fillRef>
+          <a:effectRef idx="0">
+            <a:schemeClr val="accent1"/>
+          </a:effectRef>
+          <a:fontRef idx="minor">
+            <a:schemeClr val="tx1"/>
+          </a:fontRef>
+        </p:style>
+      </p:cxnSp>
+      <p:sp>
+        <p:nvSpPr>
+          <p:cNvPr id="231" name="CuadroTexto 230"/>
+          <p:cNvSpPr txBox="1"/>
+          <p:nvPr/>
+        </p:nvSpPr>
+        <p:spPr>
+          <a:xfrm>
+            <a:off x="10348804" y="4368437"/>
+            <a:ext cx="464208" cy="215444"/>
+          </a:xfrm>
+          <a:prstGeom prst="rect">
+            <a:avLst/>
+          </a:prstGeom>
+          <a:noFill/>
+        </p:spPr>
+        <p:txBody>
+          <a:bodyPr wrap="square" rtlCol="0">
+            <a:spAutoFit/>
+          </a:bodyPr>
+          <a:lstStyle/>
+          <a:p>
+            <a:r>
+              <a:rPr lang="es-ES" sz="800" dirty="0" smtClean="0"/>
+              <a:t>Si</a:t>
+            </a:r>
+            <a:endParaRPr lang="es-CO" sz="800" dirty="0"/>
+          </a:p>
+        </p:txBody>
+      </p:sp>
+    </p:spTree>
+    <p:extLst>
+      <p:ext uri="{BB962C8B-B14F-4D97-AF65-F5344CB8AC3E}">
+        <p14:creationId xmlns:p14="http://schemas.microsoft.com/office/powerpoint/2010/main" val="541857137"/>
       </p:ext>
     </p:extLst>
   </p:cSld>

</xml_diff>